<commit_message>
add partners in index clients and partners
</commit_message>
<xml_diff>
--- a/regulationdocs/assessment/candidate-assessment-schema.pptx
+++ b/regulationdocs/assessment/candidate-assessment-schema.pptx
@@ -2,13 +2,13 @@
 <file path=ppt/presentation.xml><?xml version="1.0" encoding="utf-8"?>
 <p:presentation xmlns:a="http://schemas.openxmlformats.org/drawingml/2006/main" xmlns:r="http://schemas.openxmlformats.org/officeDocument/2006/relationships" xmlns:p="http://schemas.openxmlformats.org/presentationml/2006/main" saveSubsetFonts="1">
   <p:sldMasterIdLst>
-    <p:sldMasterId id="2147483648" r:id="rId1"/>
+    <p:sldMasterId id="2147483783" r:id="rId1"/>
   </p:sldMasterIdLst>
   <p:sldIdLst>
-    <p:sldId id="257" r:id="rId2"/>
+    <p:sldId id="256" r:id="rId2"/>
   </p:sldIdLst>
   <p:sldSz cx="9144000" cy="6858000" type="screen4x3"/>
-  <p:notesSz cx="6858000" cy="9144000"/>
+  <p:notesSz cx="6797675" cy="9926638"/>
   <p:defaultTextStyle>
     <a:defPPr>
       <a:defRPr lang="ru-RU"/>
@@ -104,6 +104,11 @@
       </a:defRPr>
     </a:lvl9pPr>
   </p:defaultTextStyle>
+  <p:extLst>
+    <p:ext uri="{EFAFB233-063F-42B5-8137-9DF3F51BA10A}">
+      <p15:sldGuideLst xmlns:p15="http://schemas.microsoft.com/office/powerpoint/2012/main"/>
+    </p:ext>
+  </p:extLst>
 </p:presentation>
 </file>
 
@@ -136,13 +141,17 @@
         </p:nvSpPr>
         <p:spPr>
           <a:xfrm>
-            <a:off x="685800" y="2130425"/>
-            <a:ext cx="7772400" cy="1470025"/>
-          </a:xfrm>
-        </p:spPr>
-        <p:txBody>
-          <a:bodyPr/>
-          <a:lstStyle/>
+            <a:off x="1143000" y="1122363"/>
+            <a:ext cx="6858000" cy="2387600"/>
+          </a:xfrm>
+        </p:spPr>
+        <p:txBody>
+          <a:bodyPr anchor="b"/>
+          <a:lstStyle>
+            <a:lvl1pPr algn="ctr">
+              <a:defRPr sz="4500"/>
+            </a:lvl1pPr>
+          </a:lstStyle>
           <a:p>
             <a:r>
               <a:rPr lang="ru-RU" smtClean="0"/>
@@ -164,8 +173,8 @@
         </p:nvSpPr>
         <p:spPr>
           <a:xfrm>
-            <a:off x="1371600" y="3886200"/>
-            <a:ext cx="6400800" cy="1752600"/>
+            <a:off x="1143000" y="3602038"/>
+            <a:ext cx="6858000" cy="1655762"/>
           </a:xfrm>
         </p:spPr>
         <p:txBody>
@@ -173,93 +182,39 @@
           <a:lstStyle>
             <a:lvl1pPr marL="0" indent="0" algn="ctr">
               <a:buNone/>
-              <a:defRPr>
-                <a:solidFill>
-                  <a:schemeClr val="tx1">
-                    <a:tint val="75000"/>
-                  </a:schemeClr>
-                </a:solidFill>
-              </a:defRPr>
+              <a:defRPr sz="1800"/>
             </a:lvl1pPr>
-            <a:lvl2pPr marL="457200" indent="0" algn="ctr">
-              <a:buNone/>
-              <a:defRPr>
-                <a:solidFill>
-                  <a:schemeClr val="tx1">
-                    <a:tint val="75000"/>
-                  </a:schemeClr>
-                </a:solidFill>
-              </a:defRPr>
+            <a:lvl2pPr marL="342900" indent="0" algn="ctr">
+              <a:buNone/>
+              <a:defRPr sz="1500"/>
             </a:lvl2pPr>
-            <a:lvl3pPr marL="914400" indent="0" algn="ctr">
-              <a:buNone/>
-              <a:defRPr>
-                <a:solidFill>
-                  <a:schemeClr val="tx1">
-                    <a:tint val="75000"/>
-                  </a:schemeClr>
-                </a:solidFill>
-              </a:defRPr>
+            <a:lvl3pPr marL="685800" indent="0" algn="ctr">
+              <a:buNone/>
+              <a:defRPr sz="1350"/>
             </a:lvl3pPr>
-            <a:lvl4pPr marL="1371600" indent="0" algn="ctr">
-              <a:buNone/>
-              <a:defRPr>
-                <a:solidFill>
-                  <a:schemeClr val="tx1">
-                    <a:tint val="75000"/>
-                  </a:schemeClr>
-                </a:solidFill>
-              </a:defRPr>
+            <a:lvl4pPr marL="1028700" indent="0" algn="ctr">
+              <a:buNone/>
+              <a:defRPr sz="1200"/>
             </a:lvl4pPr>
-            <a:lvl5pPr marL="1828800" indent="0" algn="ctr">
-              <a:buNone/>
-              <a:defRPr>
-                <a:solidFill>
-                  <a:schemeClr val="tx1">
-                    <a:tint val="75000"/>
-                  </a:schemeClr>
-                </a:solidFill>
-              </a:defRPr>
+            <a:lvl5pPr marL="1371600" indent="0" algn="ctr">
+              <a:buNone/>
+              <a:defRPr sz="1200"/>
             </a:lvl5pPr>
-            <a:lvl6pPr marL="2286000" indent="0" algn="ctr">
-              <a:buNone/>
-              <a:defRPr>
-                <a:solidFill>
-                  <a:schemeClr val="tx1">
-                    <a:tint val="75000"/>
-                  </a:schemeClr>
-                </a:solidFill>
-              </a:defRPr>
+            <a:lvl6pPr marL="1714500" indent="0" algn="ctr">
+              <a:buNone/>
+              <a:defRPr sz="1200"/>
             </a:lvl6pPr>
-            <a:lvl7pPr marL="2743200" indent="0" algn="ctr">
-              <a:buNone/>
-              <a:defRPr>
-                <a:solidFill>
-                  <a:schemeClr val="tx1">
-                    <a:tint val="75000"/>
-                  </a:schemeClr>
-                </a:solidFill>
-              </a:defRPr>
+            <a:lvl7pPr marL="2057400" indent="0" algn="ctr">
+              <a:buNone/>
+              <a:defRPr sz="1200"/>
             </a:lvl7pPr>
-            <a:lvl8pPr marL="3200400" indent="0" algn="ctr">
-              <a:buNone/>
-              <a:defRPr>
-                <a:solidFill>
-                  <a:schemeClr val="tx1">
-                    <a:tint val="75000"/>
-                  </a:schemeClr>
-                </a:solidFill>
-              </a:defRPr>
+            <a:lvl8pPr marL="2400300" indent="0" algn="ctr">
+              <a:buNone/>
+              <a:defRPr sz="1200"/>
             </a:lvl8pPr>
-            <a:lvl9pPr marL="3657600" indent="0" algn="ctr">
-              <a:buNone/>
-              <a:defRPr>
-                <a:solidFill>
-                  <a:schemeClr val="tx1">
-                    <a:tint val="75000"/>
-                  </a:schemeClr>
-                </a:solidFill>
-              </a:defRPr>
+            <a:lvl9pPr marL="2743200" indent="0" algn="ctr">
+              <a:buNone/>
+              <a:defRPr sz="1200"/>
             </a:lvl9pPr>
           </a:lstStyle>
           <a:p>
@@ -286,9 +241,9 @@
           <a:bodyPr/>
           <a:lstStyle/>
           <a:p>
-            <a:fld id="{7326E625-7DCE-4FFD-9C1E-668849BEE15C}" type="datetimeFigureOut">
-              <a:rPr lang="ru-RU" smtClean="0"/>
-              <a:t>15.05.2017</a:t>
+            <a:fld id="{B0828F7B-BD2E-4C7D-BE82-70B58EA96151}" type="datetimeFigureOut">
+              <a:rPr lang="ru-RU" smtClean="0"/>
+              <a:t>15.11.2022</a:t>
             </a:fld>
             <a:endParaRPr lang="ru-RU"/>
           </a:p>
@@ -328,7 +283,7 @@
           <a:bodyPr/>
           <a:lstStyle/>
           <a:p>
-            <a:fld id="{3281323C-A1B1-4E87-9113-18A81EC11C88}" type="slidenum">
+            <a:fld id="{4F023A34-82CD-4406-B56F-4524DA9D1E3A}" type="slidenum">
               <a:rPr lang="ru-RU" smtClean="0"/>
               <a:t>‹#›</a:t>
             </a:fld>
@@ -339,7 +294,7 @@
     </p:spTree>
     <p:extLst>
       <p:ext uri="{BB962C8B-B14F-4D97-AF65-F5344CB8AC3E}">
-        <p14:creationId xmlns:p14="http://schemas.microsoft.com/office/powerpoint/2010/main" val="2615162582"/>
+        <p14:creationId xmlns:p14="http://schemas.microsoft.com/office/powerpoint/2010/main" val="1252770893"/>
       </p:ext>
     </p:extLst>
   </p:cSld>
@@ -456,9 +411,9 @@
           <a:bodyPr/>
           <a:lstStyle/>
           <a:p>
-            <a:fld id="{7326E625-7DCE-4FFD-9C1E-668849BEE15C}" type="datetimeFigureOut">
-              <a:rPr lang="ru-RU" smtClean="0"/>
-              <a:t>15.05.2017</a:t>
+            <a:fld id="{B0828F7B-BD2E-4C7D-BE82-70B58EA96151}" type="datetimeFigureOut">
+              <a:rPr lang="ru-RU" smtClean="0"/>
+              <a:t>15.11.2022</a:t>
             </a:fld>
             <a:endParaRPr lang="ru-RU"/>
           </a:p>
@@ -498,7 +453,7 @@
           <a:bodyPr/>
           <a:lstStyle/>
           <a:p>
-            <a:fld id="{3281323C-A1B1-4E87-9113-18A81EC11C88}" type="slidenum">
+            <a:fld id="{4F023A34-82CD-4406-B56F-4524DA9D1E3A}" type="slidenum">
               <a:rPr lang="ru-RU" smtClean="0"/>
               <a:t>‹#›</a:t>
             </a:fld>
@@ -509,7 +464,7 @@
     </p:spTree>
     <p:extLst>
       <p:ext uri="{BB962C8B-B14F-4D97-AF65-F5344CB8AC3E}">
-        <p14:creationId xmlns:p14="http://schemas.microsoft.com/office/powerpoint/2010/main" val="89164889"/>
+        <p14:creationId xmlns:p14="http://schemas.microsoft.com/office/powerpoint/2010/main" val="3713476688"/>
       </p:ext>
     </p:extLst>
   </p:cSld>
@@ -548,8 +503,8 @@
         </p:nvSpPr>
         <p:spPr>
           <a:xfrm>
-            <a:off x="6629400" y="274638"/>
-            <a:ext cx="2057400" cy="5851525"/>
+            <a:off x="6543675" y="365125"/>
+            <a:ext cx="1971675" cy="5811838"/>
           </a:xfrm>
         </p:spPr>
         <p:txBody>
@@ -576,8 +531,8 @@
         </p:nvSpPr>
         <p:spPr>
           <a:xfrm>
-            <a:off x="457200" y="274638"/>
-            <a:ext cx="6019800" cy="5851525"/>
+            <a:off x="628650" y="365125"/>
+            <a:ext cx="5800725" cy="5811838"/>
           </a:xfrm>
         </p:spPr>
         <p:txBody>
@@ -636,9 +591,9 @@
           <a:bodyPr/>
           <a:lstStyle/>
           <a:p>
-            <a:fld id="{7326E625-7DCE-4FFD-9C1E-668849BEE15C}" type="datetimeFigureOut">
-              <a:rPr lang="ru-RU" smtClean="0"/>
-              <a:t>15.05.2017</a:t>
+            <a:fld id="{B0828F7B-BD2E-4C7D-BE82-70B58EA96151}" type="datetimeFigureOut">
+              <a:rPr lang="ru-RU" smtClean="0"/>
+              <a:t>15.11.2022</a:t>
             </a:fld>
             <a:endParaRPr lang="ru-RU"/>
           </a:p>
@@ -678,7 +633,7 @@
           <a:bodyPr/>
           <a:lstStyle/>
           <a:p>
-            <a:fld id="{3281323C-A1B1-4E87-9113-18A81EC11C88}" type="slidenum">
+            <a:fld id="{4F023A34-82CD-4406-B56F-4524DA9D1E3A}" type="slidenum">
               <a:rPr lang="ru-RU" smtClean="0"/>
               <a:t>‹#›</a:t>
             </a:fld>
@@ -689,94 +644,13 @@
     </p:spTree>
     <p:extLst>
       <p:ext uri="{BB962C8B-B14F-4D97-AF65-F5344CB8AC3E}">
-        <p14:creationId xmlns:p14="http://schemas.microsoft.com/office/powerpoint/2010/main" val="1056909687"/>
+        <p14:creationId xmlns:p14="http://schemas.microsoft.com/office/powerpoint/2010/main" val="1272543995"/>
       </p:ext>
     </p:extLst>
   </p:cSld>
   <p:clrMapOvr>
     <a:masterClrMapping/>
   </p:clrMapOvr>
-</p:sldLayout>
-</file>
-
-<file path=ppt/slideLayouts/slideLayout12.xml><?xml version="1.0" encoding="utf-8"?>
-<p:sldLayout xmlns:a="http://schemas.openxmlformats.org/drawingml/2006/main" xmlns:r="http://schemas.openxmlformats.org/officeDocument/2006/relationships" xmlns:p="http://schemas.openxmlformats.org/presentationml/2006/main" showMasterSp="0" userDrawn="1">
-  <p:cSld name="Пользовательский макет">
-    <p:bg>
-      <p:bgPr>
-        <a:blipFill>
-          <a:blip r:embed="rId2" cstate="print"/>
-          <a:stretch>
-            <a:fillRect/>
-          </a:stretch>
-        </a:blipFill>
-        <a:effectLst/>
-      </p:bgPr>
-    </p:bg>
-    <p:spTree>
-      <p:nvGrpSpPr>
-        <p:cNvPr id="1" name=""/>
-        <p:cNvGrpSpPr/>
-        <p:nvPr/>
-      </p:nvGrpSpPr>
-      <p:grpSpPr>
-        <a:xfrm>
-          <a:off x="0" y="0"/>
-          <a:ext cx="0" cy="0"/>
-          <a:chOff x="0" y="0"/>
-          <a:chExt cx="0" cy="0"/>
-        </a:xfrm>
-      </p:grpSpPr>
-      <p:sp>
-        <p:nvSpPr>
-          <p:cNvPr id="4" name="Заголовок 3"/>
-          <p:cNvSpPr>
-            <a:spLocks noGrp="1"/>
-          </p:cNvSpPr>
-          <p:nvPr>
-            <p:ph type="title"/>
-          </p:nvPr>
-        </p:nvSpPr>
-        <p:spPr/>
-        <p:txBody>
-          <a:bodyPr>
-            <a:normAutofit/>
-          </a:bodyPr>
-          <a:lstStyle>
-            <a:lvl1pPr>
-              <a:defRPr sz="3200">
-                <a:solidFill>
-                  <a:srgbClr val="0A7380"/>
-                </a:solidFill>
-              </a:defRPr>
-            </a:lvl1pPr>
-          </a:lstStyle>
-          <a:p>
-            <a:r>
-              <a:rPr lang="ru-RU" dirty="0" smtClean="0"/>
-              <a:t>Образец заголовка</a:t>
-            </a:r>
-            <a:endParaRPr lang="ru-RU" dirty="0"/>
-          </a:p>
-        </p:txBody>
-      </p:sp>
-    </p:spTree>
-    <p:extLst>
-      <p:ext uri="{BB962C8B-B14F-4D97-AF65-F5344CB8AC3E}">
-        <p14:creationId xmlns:p14="http://schemas.microsoft.com/office/powerpoint/2010/main" val="3738084019"/>
-      </p:ext>
-    </p:extLst>
-  </p:cSld>
-  <p:clrMapOvr>
-    <a:masterClrMapping/>
-  </p:clrMapOvr>
-  <p:timing>
-    <p:tnLst>
-      <p:par>
-        <p:cTn id="1" dur="indefinite" restart="never" nodeType="tmRoot"/>
-      </p:par>
-    </p:tnLst>
-  </p:timing>
 </p:sldLayout>
 </file>
 
@@ -887,9 +761,9 @@
           <a:bodyPr/>
           <a:lstStyle/>
           <a:p>
-            <a:fld id="{7326E625-7DCE-4FFD-9C1E-668849BEE15C}" type="datetimeFigureOut">
-              <a:rPr lang="ru-RU" smtClean="0"/>
-              <a:t>15.05.2017</a:t>
+            <a:fld id="{B0828F7B-BD2E-4C7D-BE82-70B58EA96151}" type="datetimeFigureOut">
+              <a:rPr lang="ru-RU" smtClean="0"/>
+              <a:t>15.11.2022</a:t>
             </a:fld>
             <a:endParaRPr lang="ru-RU"/>
           </a:p>
@@ -929,7 +803,7 @@
           <a:bodyPr/>
           <a:lstStyle/>
           <a:p>
-            <a:fld id="{3281323C-A1B1-4E87-9113-18A81EC11C88}" type="slidenum">
+            <a:fld id="{4F023A34-82CD-4406-B56F-4524DA9D1E3A}" type="slidenum">
               <a:rPr lang="ru-RU" smtClean="0"/>
               <a:t>‹#›</a:t>
             </a:fld>
@@ -940,7 +814,7 @@
     </p:spTree>
     <p:extLst>
       <p:ext uri="{BB962C8B-B14F-4D97-AF65-F5344CB8AC3E}">
-        <p14:creationId xmlns:p14="http://schemas.microsoft.com/office/powerpoint/2010/main" val="2411305638"/>
+        <p14:creationId xmlns:p14="http://schemas.microsoft.com/office/powerpoint/2010/main" val="3728321669"/>
       </p:ext>
     </p:extLst>
   </p:cSld>
@@ -979,15 +853,15 @@
         </p:nvSpPr>
         <p:spPr>
           <a:xfrm>
-            <a:off x="722313" y="4406900"/>
-            <a:ext cx="7772400" cy="1362075"/>
-          </a:xfrm>
-        </p:spPr>
-        <p:txBody>
-          <a:bodyPr anchor="t"/>
+            <a:off x="623888" y="1709739"/>
+            <a:ext cx="7886700" cy="2852737"/>
+          </a:xfrm>
+        </p:spPr>
+        <p:txBody>
+          <a:bodyPr anchor="b"/>
           <a:lstStyle>
-            <a:lvl1pPr algn="l">
-              <a:defRPr sz="4000" b="1" cap="all"/>
+            <a:lvl1pPr>
+              <a:defRPr sz="4500"/>
             </a:lvl1pPr>
           </a:lstStyle>
           <a:p>
@@ -1011,16 +885,16 @@
         </p:nvSpPr>
         <p:spPr>
           <a:xfrm>
-            <a:off x="722313" y="2906713"/>
-            <a:ext cx="7772400" cy="1500187"/>
-          </a:xfrm>
-        </p:spPr>
-        <p:txBody>
-          <a:bodyPr anchor="b"/>
+            <a:off x="623888" y="4589464"/>
+            <a:ext cx="7886700" cy="1500187"/>
+          </a:xfrm>
+        </p:spPr>
+        <p:txBody>
+          <a:bodyPr/>
           <a:lstStyle>
             <a:lvl1pPr marL="0" indent="0">
               <a:buNone/>
-              <a:defRPr sz="2000">
+              <a:defRPr sz="1800">
                 <a:solidFill>
                   <a:schemeClr val="tx1">
                     <a:tint val="75000"/>
@@ -1028,9 +902,9 @@
                 </a:solidFill>
               </a:defRPr>
             </a:lvl1pPr>
-            <a:lvl2pPr marL="457200" indent="0">
-              <a:buNone/>
-              <a:defRPr sz="1800">
+            <a:lvl2pPr marL="342900" indent="0">
+              <a:buNone/>
+              <a:defRPr sz="1500">
                 <a:solidFill>
                   <a:schemeClr val="tx1">
                     <a:tint val="75000"/>
@@ -1038,9 +912,9 @@
                 </a:solidFill>
               </a:defRPr>
             </a:lvl2pPr>
-            <a:lvl3pPr marL="914400" indent="0">
-              <a:buNone/>
-              <a:defRPr sz="1600">
+            <a:lvl3pPr marL="685800" indent="0">
+              <a:buNone/>
+              <a:defRPr sz="1350">
                 <a:solidFill>
                   <a:schemeClr val="tx1">
                     <a:tint val="75000"/>
@@ -1048,9 +922,9 @@
                 </a:solidFill>
               </a:defRPr>
             </a:lvl3pPr>
-            <a:lvl4pPr marL="1371600" indent="0">
-              <a:buNone/>
-              <a:defRPr sz="1400">
+            <a:lvl4pPr marL="1028700" indent="0">
+              <a:buNone/>
+              <a:defRPr sz="1200">
                 <a:solidFill>
                   <a:schemeClr val="tx1">
                     <a:tint val="75000"/>
@@ -1058,9 +932,9 @@
                 </a:solidFill>
               </a:defRPr>
             </a:lvl4pPr>
-            <a:lvl5pPr marL="1828800" indent="0">
-              <a:buNone/>
-              <a:defRPr sz="1400">
+            <a:lvl5pPr marL="1371600" indent="0">
+              <a:buNone/>
+              <a:defRPr sz="1200">
                 <a:solidFill>
                   <a:schemeClr val="tx1">
                     <a:tint val="75000"/>
@@ -1068,9 +942,9 @@
                 </a:solidFill>
               </a:defRPr>
             </a:lvl5pPr>
-            <a:lvl6pPr marL="2286000" indent="0">
-              <a:buNone/>
-              <a:defRPr sz="1400">
+            <a:lvl6pPr marL="1714500" indent="0">
+              <a:buNone/>
+              <a:defRPr sz="1200">
                 <a:solidFill>
                   <a:schemeClr val="tx1">
                     <a:tint val="75000"/>
@@ -1078,9 +952,9 @@
                 </a:solidFill>
               </a:defRPr>
             </a:lvl6pPr>
-            <a:lvl7pPr marL="2743200" indent="0">
-              <a:buNone/>
-              <a:defRPr sz="1400">
+            <a:lvl7pPr marL="2057400" indent="0">
+              <a:buNone/>
+              <a:defRPr sz="1200">
                 <a:solidFill>
                   <a:schemeClr val="tx1">
                     <a:tint val="75000"/>
@@ -1088,9 +962,9 @@
                 </a:solidFill>
               </a:defRPr>
             </a:lvl7pPr>
-            <a:lvl8pPr marL="3200400" indent="0">
-              <a:buNone/>
-              <a:defRPr sz="1400">
+            <a:lvl8pPr marL="2400300" indent="0">
+              <a:buNone/>
+              <a:defRPr sz="1200">
                 <a:solidFill>
                   <a:schemeClr val="tx1">
                     <a:tint val="75000"/>
@@ -1098,9 +972,9 @@
                 </a:solidFill>
               </a:defRPr>
             </a:lvl8pPr>
-            <a:lvl9pPr marL="3657600" indent="0">
-              <a:buNone/>
-              <a:defRPr sz="1400">
+            <a:lvl9pPr marL="2743200" indent="0">
+              <a:buNone/>
+              <a:defRPr sz="1200">
                 <a:solidFill>
                   <a:schemeClr val="tx1">
                     <a:tint val="75000"/>
@@ -1133,9 +1007,9 @@
           <a:bodyPr/>
           <a:lstStyle/>
           <a:p>
-            <a:fld id="{7326E625-7DCE-4FFD-9C1E-668849BEE15C}" type="datetimeFigureOut">
-              <a:rPr lang="ru-RU" smtClean="0"/>
-              <a:t>15.05.2017</a:t>
+            <a:fld id="{B0828F7B-BD2E-4C7D-BE82-70B58EA96151}" type="datetimeFigureOut">
+              <a:rPr lang="ru-RU" smtClean="0"/>
+              <a:t>15.11.2022</a:t>
             </a:fld>
             <a:endParaRPr lang="ru-RU"/>
           </a:p>
@@ -1175,7 +1049,7 @@
           <a:bodyPr/>
           <a:lstStyle/>
           <a:p>
-            <a:fld id="{3281323C-A1B1-4E87-9113-18A81EC11C88}" type="slidenum">
+            <a:fld id="{4F023A34-82CD-4406-B56F-4524DA9D1E3A}" type="slidenum">
               <a:rPr lang="ru-RU" smtClean="0"/>
               <a:t>‹#›</a:t>
             </a:fld>
@@ -1186,7 +1060,7 @@
     </p:spTree>
     <p:extLst>
       <p:ext uri="{BB962C8B-B14F-4D97-AF65-F5344CB8AC3E}">
-        <p14:creationId xmlns:p14="http://schemas.microsoft.com/office/powerpoint/2010/main" val="3282197944"/>
+        <p14:creationId xmlns:p14="http://schemas.microsoft.com/office/powerpoint/2010/main" val="2858653440"/>
       </p:ext>
     </p:extLst>
   </p:cSld>
@@ -1248,41 +1122,13 @@
         </p:nvSpPr>
         <p:spPr>
           <a:xfrm>
-            <a:off x="457200" y="1600200"/>
-            <a:ext cx="4038600" cy="4525963"/>
-          </a:xfrm>
-        </p:spPr>
-        <p:txBody>
-          <a:bodyPr/>
-          <a:lstStyle>
-            <a:lvl1pPr>
-              <a:defRPr sz="2800"/>
-            </a:lvl1pPr>
-            <a:lvl2pPr>
-              <a:defRPr sz="2400"/>
-            </a:lvl2pPr>
-            <a:lvl3pPr>
-              <a:defRPr sz="2000"/>
-            </a:lvl3pPr>
-            <a:lvl4pPr>
-              <a:defRPr sz="1800"/>
-            </a:lvl4pPr>
-            <a:lvl5pPr>
-              <a:defRPr sz="1800"/>
-            </a:lvl5pPr>
-            <a:lvl6pPr>
-              <a:defRPr sz="1800"/>
-            </a:lvl6pPr>
-            <a:lvl7pPr>
-              <a:defRPr sz="1800"/>
-            </a:lvl7pPr>
-            <a:lvl8pPr>
-              <a:defRPr sz="1800"/>
-            </a:lvl8pPr>
-            <a:lvl9pPr>
-              <a:defRPr sz="1800"/>
-            </a:lvl9pPr>
-          </a:lstStyle>
+            <a:off x="628650" y="1825625"/>
+            <a:ext cx="3886200" cy="4351338"/>
+          </a:xfrm>
+        </p:spPr>
+        <p:txBody>
+          <a:bodyPr/>
+          <a:lstStyle/>
           <a:p>
             <a:pPr lvl="0"/>
             <a:r>
@@ -1333,41 +1179,13 @@
         </p:nvSpPr>
         <p:spPr>
           <a:xfrm>
-            <a:off x="4648200" y="1600200"/>
-            <a:ext cx="4038600" cy="4525963"/>
-          </a:xfrm>
-        </p:spPr>
-        <p:txBody>
-          <a:bodyPr/>
-          <a:lstStyle>
-            <a:lvl1pPr>
-              <a:defRPr sz="2800"/>
-            </a:lvl1pPr>
-            <a:lvl2pPr>
-              <a:defRPr sz="2400"/>
-            </a:lvl2pPr>
-            <a:lvl3pPr>
-              <a:defRPr sz="2000"/>
-            </a:lvl3pPr>
-            <a:lvl4pPr>
-              <a:defRPr sz="1800"/>
-            </a:lvl4pPr>
-            <a:lvl5pPr>
-              <a:defRPr sz="1800"/>
-            </a:lvl5pPr>
-            <a:lvl6pPr>
-              <a:defRPr sz="1800"/>
-            </a:lvl6pPr>
-            <a:lvl7pPr>
-              <a:defRPr sz="1800"/>
-            </a:lvl7pPr>
-            <a:lvl8pPr>
-              <a:defRPr sz="1800"/>
-            </a:lvl8pPr>
-            <a:lvl9pPr>
-              <a:defRPr sz="1800"/>
-            </a:lvl9pPr>
-          </a:lstStyle>
+            <a:off x="4629150" y="1825625"/>
+            <a:ext cx="3886200" cy="4351338"/>
+          </a:xfrm>
+        </p:spPr>
+        <p:txBody>
+          <a:bodyPr/>
+          <a:lstStyle/>
           <a:p>
             <a:pPr lvl="0"/>
             <a:r>
@@ -1421,9 +1239,9 @@
           <a:bodyPr/>
           <a:lstStyle/>
           <a:p>
-            <a:fld id="{7326E625-7DCE-4FFD-9C1E-668849BEE15C}" type="datetimeFigureOut">
-              <a:rPr lang="ru-RU" smtClean="0"/>
-              <a:t>15.05.2017</a:t>
+            <a:fld id="{B0828F7B-BD2E-4C7D-BE82-70B58EA96151}" type="datetimeFigureOut">
+              <a:rPr lang="ru-RU" smtClean="0"/>
+              <a:t>15.11.2022</a:t>
             </a:fld>
             <a:endParaRPr lang="ru-RU"/>
           </a:p>
@@ -1463,7 +1281,7 @@
           <a:bodyPr/>
           <a:lstStyle/>
           <a:p>
-            <a:fld id="{3281323C-A1B1-4E87-9113-18A81EC11C88}" type="slidenum">
+            <a:fld id="{4F023A34-82CD-4406-B56F-4524DA9D1E3A}" type="slidenum">
               <a:rPr lang="ru-RU" smtClean="0"/>
               <a:t>‹#›</a:t>
             </a:fld>
@@ -1474,13 +1292,18 @@
     </p:spTree>
     <p:extLst>
       <p:ext uri="{BB962C8B-B14F-4D97-AF65-F5344CB8AC3E}">
-        <p14:creationId xmlns:p14="http://schemas.microsoft.com/office/powerpoint/2010/main" val="3301179478"/>
+        <p14:creationId xmlns:p14="http://schemas.microsoft.com/office/powerpoint/2010/main" val="3195382619"/>
       </p:ext>
     </p:extLst>
   </p:cSld>
   <p:clrMapOvr>
     <a:masterClrMapping/>
   </p:clrMapOvr>
+  <p:extLst>
+    <p:ext uri="{DCECCB84-F9BA-43D5-87BE-67443E8EF086}">
+      <p15:sldGuideLst xmlns:p15="http://schemas.microsoft.com/office/powerpoint/2012/main"/>
+    </p:ext>
+  </p:extLst>
 </p:sldLayout>
 </file>
 
@@ -1511,14 +1334,15 @@
             <p:ph type="title"/>
           </p:nvPr>
         </p:nvSpPr>
-        <p:spPr/>
-        <p:txBody>
-          <a:bodyPr/>
-          <a:lstStyle>
-            <a:lvl1pPr>
-              <a:defRPr/>
-            </a:lvl1pPr>
-          </a:lstStyle>
+        <p:spPr>
+          <a:xfrm>
+            <a:off x="629841" y="365126"/>
+            <a:ext cx="7886700" cy="1325563"/>
+          </a:xfrm>
+        </p:spPr>
+        <p:txBody>
+          <a:bodyPr/>
+          <a:lstStyle/>
           <a:p>
             <a:r>
               <a:rPr lang="ru-RU" smtClean="0"/>
@@ -1540,8 +1364,8 @@
         </p:nvSpPr>
         <p:spPr>
           <a:xfrm>
-            <a:off x="457200" y="1535113"/>
-            <a:ext cx="4040188" cy="639762"/>
+            <a:off x="629842" y="1681163"/>
+            <a:ext cx="3868340" cy="823912"/>
           </a:xfrm>
         </p:spPr>
         <p:txBody>
@@ -1549,39 +1373,39 @@
           <a:lstStyle>
             <a:lvl1pPr marL="0" indent="0">
               <a:buNone/>
-              <a:defRPr sz="2400" b="1"/>
+              <a:defRPr sz="1800" b="1"/>
             </a:lvl1pPr>
-            <a:lvl2pPr marL="457200" indent="0">
-              <a:buNone/>
-              <a:defRPr sz="2000" b="1"/>
+            <a:lvl2pPr marL="342900" indent="0">
+              <a:buNone/>
+              <a:defRPr sz="1500" b="1"/>
             </a:lvl2pPr>
-            <a:lvl3pPr marL="914400" indent="0">
-              <a:buNone/>
-              <a:defRPr sz="1800" b="1"/>
+            <a:lvl3pPr marL="685800" indent="0">
+              <a:buNone/>
+              <a:defRPr sz="1350" b="1"/>
             </a:lvl3pPr>
-            <a:lvl4pPr marL="1371600" indent="0">
-              <a:buNone/>
-              <a:defRPr sz="1600" b="1"/>
+            <a:lvl4pPr marL="1028700" indent="0">
+              <a:buNone/>
+              <a:defRPr sz="1200" b="1"/>
             </a:lvl4pPr>
-            <a:lvl5pPr marL="1828800" indent="0">
-              <a:buNone/>
-              <a:defRPr sz="1600" b="1"/>
+            <a:lvl5pPr marL="1371600" indent="0">
+              <a:buNone/>
+              <a:defRPr sz="1200" b="1"/>
             </a:lvl5pPr>
-            <a:lvl6pPr marL="2286000" indent="0">
-              <a:buNone/>
-              <a:defRPr sz="1600" b="1"/>
+            <a:lvl6pPr marL="1714500" indent="0">
+              <a:buNone/>
+              <a:defRPr sz="1200" b="1"/>
             </a:lvl6pPr>
-            <a:lvl7pPr marL="2743200" indent="0">
-              <a:buNone/>
-              <a:defRPr sz="1600" b="1"/>
+            <a:lvl7pPr marL="2057400" indent="0">
+              <a:buNone/>
+              <a:defRPr sz="1200" b="1"/>
             </a:lvl7pPr>
-            <a:lvl8pPr marL="3200400" indent="0">
-              <a:buNone/>
-              <a:defRPr sz="1600" b="1"/>
+            <a:lvl8pPr marL="2400300" indent="0">
+              <a:buNone/>
+              <a:defRPr sz="1200" b="1"/>
             </a:lvl8pPr>
-            <a:lvl9pPr marL="3657600" indent="0">
-              <a:buNone/>
-              <a:defRPr sz="1600" b="1"/>
+            <a:lvl9pPr marL="2743200" indent="0">
+              <a:buNone/>
+              <a:defRPr sz="1200" b="1"/>
             </a:lvl9pPr>
           </a:lstStyle>
           <a:p>
@@ -1605,41 +1429,13 @@
         </p:nvSpPr>
         <p:spPr>
           <a:xfrm>
-            <a:off x="457200" y="2174875"/>
-            <a:ext cx="4040188" cy="3951288"/>
-          </a:xfrm>
-        </p:spPr>
-        <p:txBody>
-          <a:bodyPr/>
-          <a:lstStyle>
-            <a:lvl1pPr>
-              <a:defRPr sz="2400"/>
-            </a:lvl1pPr>
-            <a:lvl2pPr>
-              <a:defRPr sz="2000"/>
-            </a:lvl2pPr>
-            <a:lvl3pPr>
-              <a:defRPr sz="1800"/>
-            </a:lvl3pPr>
-            <a:lvl4pPr>
-              <a:defRPr sz="1600"/>
-            </a:lvl4pPr>
-            <a:lvl5pPr>
-              <a:defRPr sz="1600"/>
-            </a:lvl5pPr>
-            <a:lvl6pPr>
-              <a:defRPr sz="1600"/>
-            </a:lvl6pPr>
-            <a:lvl7pPr>
-              <a:defRPr sz="1600"/>
-            </a:lvl7pPr>
-            <a:lvl8pPr>
-              <a:defRPr sz="1600"/>
-            </a:lvl8pPr>
-            <a:lvl9pPr>
-              <a:defRPr sz="1600"/>
-            </a:lvl9pPr>
-          </a:lstStyle>
+            <a:off x="629842" y="2505075"/>
+            <a:ext cx="3868340" cy="3684588"/>
+          </a:xfrm>
+        </p:spPr>
+        <p:txBody>
+          <a:bodyPr/>
+          <a:lstStyle/>
           <a:p>
             <a:pPr lvl="0"/>
             <a:r>
@@ -1690,8 +1486,8 @@
         </p:nvSpPr>
         <p:spPr>
           <a:xfrm>
-            <a:off x="4645025" y="1535113"/>
-            <a:ext cx="4041775" cy="639762"/>
+            <a:off x="4629150" y="1681163"/>
+            <a:ext cx="3887391" cy="823912"/>
           </a:xfrm>
         </p:spPr>
         <p:txBody>
@@ -1699,39 +1495,39 @@
           <a:lstStyle>
             <a:lvl1pPr marL="0" indent="0">
               <a:buNone/>
-              <a:defRPr sz="2400" b="1"/>
+              <a:defRPr sz="1800" b="1"/>
             </a:lvl1pPr>
-            <a:lvl2pPr marL="457200" indent="0">
-              <a:buNone/>
-              <a:defRPr sz="2000" b="1"/>
+            <a:lvl2pPr marL="342900" indent="0">
+              <a:buNone/>
+              <a:defRPr sz="1500" b="1"/>
             </a:lvl2pPr>
-            <a:lvl3pPr marL="914400" indent="0">
-              <a:buNone/>
-              <a:defRPr sz="1800" b="1"/>
+            <a:lvl3pPr marL="685800" indent="0">
+              <a:buNone/>
+              <a:defRPr sz="1350" b="1"/>
             </a:lvl3pPr>
-            <a:lvl4pPr marL="1371600" indent="0">
-              <a:buNone/>
-              <a:defRPr sz="1600" b="1"/>
+            <a:lvl4pPr marL="1028700" indent="0">
+              <a:buNone/>
+              <a:defRPr sz="1200" b="1"/>
             </a:lvl4pPr>
-            <a:lvl5pPr marL="1828800" indent="0">
-              <a:buNone/>
-              <a:defRPr sz="1600" b="1"/>
+            <a:lvl5pPr marL="1371600" indent="0">
+              <a:buNone/>
+              <a:defRPr sz="1200" b="1"/>
             </a:lvl5pPr>
-            <a:lvl6pPr marL="2286000" indent="0">
-              <a:buNone/>
-              <a:defRPr sz="1600" b="1"/>
+            <a:lvl6pPr marL="1714500" indent="0">
+              <a:buNone/>
+              <a:defRPr sz="1200" b="1"/>
             </a:lvl6pPr>
-            <a:lvl7pPr marL="2743200" indent="0">
-              <a:buNone/>
-              <a:defRPr sz="1600" b="1"/>
+            <a:lvl7pPr marL="2057400" indent="0">
+              <a:buNone/>
+              <a:defRPr sz="1200" b="1"/>
             </a:lvl7pPr>
-            <a:lvl8pPr marL="3200400" indent="0">
-              <a:buNone/>
-              <a:defRPr sz="1600" b="1"/>
+            <a:lvl8pPr marL="2400300" indent="0">
+              <a:buNone/>
+              <a:defRPr sz="1200" b="1"/>
             </a:lvl8pPr>
-            <a:lvl9pPr marL="3657600" indent="0">
-              <a:buNone/>
-              <a:defRPr sz="1600" b="1"/>
+            <a:lvl9pPr marL="2743200" indent="0">
+              <a:buNone/>
+              <a:defRPr sz="1200" b="1"/>
             </a:lvl9pPr>
           </a:lstStyle>
           <a:p>
@@ -1755,41 +1551,13 @@
         </p:nvSpPr>
         <p:spPr>
           <a:xfrm>
-            <a:off x="4645025" y="2174875"/>
-            <a:ext cx="4041775" cy="3951288"/>
-          </a:xfrm>
-        </p:spPr>
-        <p:txBody>
-          <a:bodyPr/>
-          <a:lstStyle>
-            <a:lvl1pPr>
-              <a:defRPr sz="2400"/>
-            </a:lvl1pPr>
-            <a:lvl2pPr>
-              <a:defRPr sz="2000"/>
-            </a:lvl2pPr>
-            <a:lvl3pPr>
-              <a:defRPr sz="1800"/>
-            </a:lvl3pPr>
-            <a:lvl4pPr>
-              <a:defRPr sz="1600"/>
-            </a:lvl4pPr>
-            <a:lvl5pPr>
-              <a:defRPr sz="1600"/>
-            </a:lvl5pPr>
-            <a:lvl6pPr>
-              <a:defRPr sz="1600"/>
-            </a:lvl6pPr>
-            <a:lvl7pPr>
-              <a:defRPr sz="1600"/>
-            </a:lvl7pPr>
-            <a:lvl8pPr>
-              <a:defRPr sz="1600"/>
-            </a:lvl8pPr>
-            <a:lvl9pPr>
-              <a:defRPr sz="1600"/>
-            </a:lvl9pPr>
-          </a:lstStyle>
+            <a:off x="4629150" y="2505075"/>
+            <a:ext cx="3887391" cy="3684588"/>
+          </a:xfrm>
+        </p:spPr>
+        <p:txBody>
+          <a:bodyPr/>
+          <a:lstStyle/>
           <a:p>
             <a:pPr lvl="0"/>
             <a:r>
@@ -1843,9 +1611,9 @@
           <a:bodyPr/>
           <a:lstStyle/>
           <a:p>
-            <a:fld id="{7326E625-7DCE-4FFD-9C1E-668849BEE15C}" type="datetimeFigureOut">
-              <a:rPr lang="ru-RU" smtClean="0"/>
-              <a:t>15.05.2017</a:t>
+            <a:fld id="{B0828F7B-BD2E-4C7D-BE82-70B58EA96151}" type="datetimeFigureOut">
+              <a:rPr lang="ru-RU" smtClean="0"/>
+              <a:t>15.11.2022</a:t>
             </a:fld>
             <a:endParaRPr lang="ru-RU"/>
           </a:p>
@@ -1885,7 +1653,7 @@
           <a:bodyPr/>
           <a:lstStyle/>
           <a:p>
-            <a:fld id="{3281323C-A1B1-4E87-9113-18A81EC11C88}" type="slidenum">
+            <a:fld id="{4F023A34-82CD-4406-B56F-4524DA9D1E3A}" type="slidenum">
               <a:rPr lang="ru-RU" smtClean="0"/>
               <a:t>‹#›</a:t>
             </a:fld>
@@ -1896,13 +1664,18 @@
     </p:spTree>
     <p:extLst>
       <p:ext uri="{BB962C8B-B14F-4D97-AF65-F5344CB8AC3E}">
-        <p14:creationId xmlns:p14="http://schemas.microsoft.com/office/powerpoint/2010/main" val="136069126"/>
+        <p14:creationId xmlns:p14="http://schemas.microsoft.com/office/powerpoint/2010/main" val="311822681"/>
       </p:ext>
     </p:extLst>
   </p:cSld>
   <p:clrMapOvr>
     <a:masterClrMapping/>
   </p:clrMapOvr>
+  <p:extLst>
+    <p:ext uri="{DCECCB84-F9BA-43D5-87BE-67443E8EF086}">
+      <p15:sldGuideLst xmlns:p15="http://schemas.microsoft.com/office/powerpoint/2012/main"/>
+    </p:ext>
+  </p:extLst>
 </p:sldLayout>
 </file>
 
@@ -1961,9 +1734,9 @@
           <a:bodyPr/>
           <a:lstStyle/>
           <a:p>
-            <a:fld id="{7326E625-7DCE-4FFD-9C1E-668849BEE15C}" type="datetimeFigureOut">
-              <a:rPr lang="ru-RU" smtClean="0"/>
-              <a:t>15.05.2017</a:t>
+            <a:fld id="{B0828F7B-BD2E-4C7D-BE82-70B58EA96151}" type="datetimeFigureOut">
+              <a:rPr lang="ru-RU" smtClean="0"/>
+              <a:t>15.11.2022</a:t>
             </a:fld>
             <a:endParaRPr lang="ru-RU"/>
           </a:p>
@@ -2003,7 +1776,7 @@
           <a:bodyPr/>
           <a:lstStyle/>
           <a:p>
-            <a:fld id="{3281323C-A1B1-4E87-9113-18A81EC11C88}" type="slidenum">
+            <a:fld id="{4F023A34-82CD-4406-B56F-4524DA9D1E3A}" type="slidenum">
               <a:rPr lang="ru-RU" smtClean="0"/>
               <a:t>‹#›</a:t>
             </a:fld>
@@ -2014,7 +1787,7 @@
     </p:spTree>
     <p:extLst>
       <p:ext uri="{BB962C8B-B14F-4D97-AF65-F5344CB8AC3E}">
-        <p14:creationId xmlns:p14="http://schemas.microsoft.com/office/powerpoint/2010/main" val="1668292758"/>
+        <p14:creationId xmlns:p14="http://schemas.microsoft.com/office/powerpoint/2010/main" val="2469488795"/>
       </p:ext>
     </p:extLst>
   </p:cSld>
@@ -2056,9 +1829,9 @@
           <a:bodyPr/>
           <a:lstStyle/>
           <a:p>
-            <a:fld id="{7326E625-7DCE-4FFD-9C1E-668849BEE15C}" type="datetimeFigureOut">
-              <a:rPr lang="ru-RU" smtClean="0"/>
-              <a:t>15.05.2017</a:t>
+            <a:fld id="{B0828F7B-BD2E-4C7D-BE82-70B58EA96151}" type="datetimeFigureOut">
+              <a:rPr lang="ru-RU" smtClean="0"/>
+              <a:t>15.11.2022</a:t>
             </a:fld>
             <a:endParaRPr lang="ru-RU"/>
           </a:p>
@@ -2098,7 +1871,7 @@
           <a:bodyPr/>
           <a:lstStyle/>
           <a:p>
-            <a:fld id="{3281323C-A1B1-4E87-9113-18A81EC11C88}" type="slidenum">
+            <a:fld id="{4F023A34-82CD-4406-B56F-4524DA9D1E3A}" type="slidenum">
               <a:rPr lang="ru-RU" smtClean="0"/>
               <a:t>‹#›</a:t>
             </a:fld>
@@ -2109,7 +1882,7 @@
     </p:spTree>
     <p:extLst>
       <p:ext uri="{BB962C8B-B14F-4D97-AF65-F5344CB8AC3E}">
-        <p14:creationId xmlns:p14="http://schemas.microsoft.com/office/powerpoint/2010/main" val="1097916395"/>
+        <p14:creationId xmlns:p14="http://schemas.microsoft.com/office/powerpoint/2010/main" val="1237976942"/>
       </p:ext>
     </p:extLst>
   </p:cSld>
@@ -2148,15 +1921,15 @@
         </p:nvSpPr>
         <p:spPr>
           <a:xfrm>
-            <a:off x="457200" y="273050"/>
-            <a:ext cx="3008313" cy="1162050"/>
+            <a:off x="629841" y="457200"/>
+            <a:ext cx="2949178" cy="1600200"/>
           </a:xfrm>
         </p:spPr>
         <p:txBody>
           <a:bodyPr anchor="b"/>
           <a:lstStyle>
-            <a:lvl1pPr algn="l">
-              <a:defRPr sz="2000" b="1"/>
+            <a:lvl1pPr>
+              <a:defRPr sz="2400"/>
             </a:lvl1pPr>
           </a:lstStyle>
           <a:p>
@@ -2180,39 +1953,39 @@
         </p:nvSpPr>
         <p:spPr>
           <a:xfrm>
-            <a:off x="3575050" y="273050"/>
-            <a:ext cx="5111750" cy="5853113"/>
+            <a:off x="3887391" y="987426"/>
+            <a:ext cx="4629150" cy="4873625"/>
           </a:xfrm>
         </p:spPr>
         <p:txBody>
           <a:bodyPr/>
           <a:lstStyle>
             <a:lvl1pPr>
-              <a:defRPr sz="3200"/>
+              <a:defRPr sz="2400"/>
             </a:lvl1pPr>
             <a:lvl2pPr>
-              <a:defRPr sz="2800"/>
+              <a:defRPr sz="2100"/>
             </a:lvl2pPr>
             <a:lvl3pPr>
-              <a:defRPr sz="2400"/>
+              <a:defRPr sz="1800"/>
             </a:lvl3pPr>
             <a:lvl4pPr>
-              <a:defRPr sz="2000"/>
+              <a:defRPr sz="1500"/>
             </a:lvl4pPr>
             <a:lvl5pPr>
-              <a:defRPr sz="2000"/>
+              <a:defRPr sz="1500"/>
             </a:lvl5pPr>
             <a:lvl6pPr>
-              <a:defRPr sz="2000"/>
+              <a:defRPr sz="1500"/>
             </a:lvl6pPr>
             <a:lvl7pPr>
-              <a:defRPr sz="2000"/>
+              <a:defRPr sz="1500"/>
             </a:lvl7pPr>
             <a:lvl8pPr>
-              <a:defRPr sz="2000"/>
+              <a:defRPr sz="1500"/>
             </a:lvl8pPr>
             <a:lvl9pPr>
-              <a:defRPr sz="2000"/>
+              <a:defRPr sz="1500"/>
             </a:lvl9pPr>
           </a:lstStyle>
           <a:p>
@@ -2265,8 +2038,8 @@
         </p:nvSpPr>
         <p:spPr>
           <a:xfrm>
-            <a:off x="457200" y="1435100"/>
-            <a:ext cx="3008313" cy="4691063"/>
+            <a:off x="629841" y="2057400"/>
+            <a:ext cx="2949178" cy="3811588"/>
           </a:xfrm>
         </p:spPr>
         <p:txBody>
@@ -2274,39 +2047,39 @@
           <a:lstStyle>
             <a:lvl1pPr marL="0" indent="0">
               <a:buNone/>
-              <a:defRPr sz="1400"/>
+              <a:defRPr sz="1200"/>
             </a:lvl1pPr>
-            <a:lvl2pPr marL="457200" indent="0">
-              <a:buNone/>
-              <a:defRPr sz="1200"/>
+            <a:lvl2pPr marL="342900" indent="0">
+              <a:buNone/>
+              <a:defRPr sz="1050"/>
             </a:lvl2pPr>
-            <a:lvl3pPr marL="914400" indent="0">
-              <a:buNone/>
-              <a:defRPr sz="1000"/>
+            <a:lvl3pPr marL="685800" indent="0">
+              <a:buNone/>
+              <a:defRPr sz="900"/>
             </a:lvl3pPr>
-            <a:lvl4pPr marL="1371600" indent="0">
-              <a:buNone/>
-              <a:defRPr sz="900"/>
+            <a:lvl4pPr marL="1028700" indent="0">
+              <a:buNone/>
+              <a:defRPr sz="750"/>
             </a:lvl4pPr>
-            <a:lvl5pPr marL="1828800" indent="0">
-              <a:buNone/>
-              <a:defRPr sz="900"/>
+            <a:lvl5pPr marL="1371600" indent="0">
+              <a:buNone/>
+              <a:defRPr sz="750"/>
             </a:lvl5pPr>
-            <a:lvl6pPr marL="2286000" indent="0">
-              <a:buNone/>
-              <a:defRPr sz="900"/>
+            <a:lvl6pPr marL="1714500" indent="0">
+              <a:buNone/>
+              <a:defRPr sz="750"/>
             </a:lvl6pPr>
-            <a:lvl7pPr marL="2743200" indent="0">
-              <a:buNone/>
-              <a:defRPr sz="900"/>
+            <a:lvl7pPr marL="2057400" indent="0">
+              <a:buNone/>
+              <a:defRPr sz="750"/>
             </a:lvl7pPr>
-            <a:lvl8pPr marL="3200400" indent="0">
-              <a:buNone/>
-              <a:defRPr sz="900"/>
+            <a:lvl8pPr marL="2400300" indent="0">
+              <a:buNone/>
+              <a:defRPr sz="750"/>
             </a:lvl8pPr>
-            <a:lvl9pPr marL="3657600" indent="0">
-              <a:buNone/>
-              <a:defRPr sz="900"/>
+            <a:lvl9pPr marL="2743200" indent="0">
+              <a:buNone/>
+              <a:defRPr sz="750"/>
             </a:lvl9pPr>
           </a:lstStyle>
           <a:p>
@@ -2333,9 +2106,9 @@
           <a:bodyPr/>
           <a:lstStyle/>
           <a:p>
-            <a:fld id="{7326E625-7DCE-4FFD-9C1E-668849BEE15C}" type="datetimeFigureOut">
-              <a:rPr lang="ru-RU" smtClean="0"/>
-              <a:t>15.05.2017</a:t>
+            <a:fld id="{B0828F7B-BD2E-4C7D-BE82-70B58EA96151}" type="datetimeFigureOut">
+              <a:rPr lang="ru-RU" smtClean="0"/>
+              <a:t>15.11.2022</a:t>
             </a:fld>
             <a:endParaRPr lang="ru-RU"/>
           </a:p>
@@ -2375,7 +2148,7 @@
           <a:bodyPr/>
           <a:lstStyle/>
           <a:p>
-            <a:fld id="{3281323C-A1B1-4E87-9113-18A81EC11C88}" type="slidenum">
+            <a:fld id="{4F023A34-82CD-4406-B56F-4524DA9D1E3A}" type="slidenum">
               <a:rPr lang="ru-RU" smtClean="0"/>
               <a:t>‹#›</a:t>
             </a:fld>
@@ -2386,13 +2159,18 @@
     </p:spTree>
     <p:extLst>
       <p:ext uri="{BB962C8B-B14F-4D97-AF65-F5344CB8AC3E}">
-        <p14:creationId xmlns:p14="http://schemas.microsoft.com/office/powerpoint/2010/main" val="3301785696"/>
+        <p14:creationId xmlns:p14="http://schemas.microsoft.com/office/powerpoint/2010/main" val="1436681177"/>
       </p:ext>
     </p:extLst>
   </p:cSld>
   <p:clrMapOvr>
     <a:masterClrMapping/>
   </p:clrMapOvr>
+  <p:extLst>
+    <p:ext uri="{DCECCB84-F9BA-43D5-87BE-67443E8EF086}">
+      <p15:sldGuideLst xmlns:p15="http://schemas.microsoft.com/office/powerpoint/2012/main"/>
+    </p:ext>
+  </p:extLst>
 </p:sldLayout>
 </file>
 
@@ -2425,15 +2203,15 @@
         </p:nvSpPr>
         <p:spPr>
           <a:xfrm>
-            <a:off x="1792288" y="4800600"/>
-            <a:ext cx="5486400" cy="566738"/>
+            <a:off x="629841" y="457200"/>
+            <a:ext cx="2949178" cy="1600200"/>
           </a:xfrm>
         </p:spPr>
         <p:txBody>
           <a:bodyPr anchor="b"/>
           <a:lstStyle>
-            <a:lvl1pPr algn="l">
-              <a:defRPr sz="2000" b="1"/>
+            <a:lvl1pPr>
+              <a:defRPr sz="2400"/>
             </a:lvl1pPr>
           </a:lstStyle>
           <a:p>
@@ -2457,8 +2235,8 @@
         </p:nvSpPr>
         <p:spPr>
           <a:xfrm>
-            <a:off x="1792288" y="612775"/>
-            <a:ext cx="5486400" cy="4114800"/>
+            <a:off x="3887391" y="987426"/>
+            <a:ext cx="4629150" cy="4873625"/>
           </a:xfrm>
         </p:spPr>
         <p:txBody>
@@ -2466,39 +2244,39 @@
           <a:lstStyle>
             <a:lvl1pPr marL="0" indent="0">
               <a:buNone/>
-              <a:defRPr sz="3200"/>
+              <a:defRPr sz="2400"/>
             </a:lvl1pPr>
-            <a:lvl2pPr marL="457200" indent="0">
-              <a:buNone/>
-              <a:defRPr sz="2800"/>
+            <a:lvl2pPr marL="342900" indent="0">
+              <a:buNone/>
+              <a:defRPr sz="2100"/>
             </a:lvl2pPr>
-            <a:lvl3pPr marL="914400" indent="0">
-              <a:buNone/>
-              <a:defRPr sz="2400"/>
+            <a:lvl3pPr marL="685800" indent="0">
+              <a:buNone/>
+              <a:defRPr sz="1800"/>
             </a:lvl3pPr>
-            <a:lvl4pPr marL="1371600" indent="0">
-              <a:buNone/>
-              <a:defRPr sz="2000"/>
+            <a:lvl4pPr marL="1028700" indent="0">
+              <a:buNone/>
+              <a:defRPr sz="1500"/>
             </a:lvl4pPr>
-            <a:lvl5pPr marL="1828800" indent="0">
-              <a:buNone/>
-              <a:defRPr sz="2000"/>
+            <a:lvl5pPr marL="1371600" indent="0">
+              <a:buNone/>
+              <a:defRPr sz="1500"/>
             </a:lvl5pPr>
-            <a:lvl6pPr marL="2286000" indent="0">
-              <a:buNone/>
-              <a:defRPr sz="2000"/>
+            <a:lvl6pPr marL="1714500" indent="0">
+              <a:buNone/>
+              <a:defRPr sz="1500"/>
             </a:lvl6pPr>
-            <a:lvl7pPr marL="2743200" indent="0">
-              <a:buNone/>
-              <a:defRPr sz="2000"/>
+            <a:lvl7pPr marL="2057400" indent="0">
+              <a:buNone/>
+              <a:defRPr sz="1500"/>
             </a:lvl7pPr>
-            <a:lvl8pPr marL="3200400" indent="0">
-              <a:buNone/>
-              <a:defRPr sz="2000"/>
+            <a:lvl8pPr marL="2400300" indent="0">
+              <a:buNone/>
+              <a:defRPr sz="1500"/>
             </a:lvl8pPr>
-            <a:lvl9pPr marL="3657600" indent="0">
-              <a:buNone/>
-              <a:defRPr sz="2000"/>
+            <a:lvl9pPr marL="2743200" indent="0">
+              <a:buNone/>
+              <a:defRPr sz="1500"/>
             </a:lvl9pPr>
           </a:lstStyle>
           <a:p>
@@ -2518,8 +2296,8 @@
         </p:nvSpPr>
         <p:spPr>
           <a:xfrm>
-            <a:off x="1792288" y="5367338"/>
-            <a:ext cx="5486400" cy="804862"/>
+            <a:off x="629841" y="2057400"/>
+            <a:ext cx="2949178" cy="3811588"/>
           </a:xfrm>
         </p:spPr>
         <p:txBody>
@@ -2527,39 +2305,39 @@
           <a:lstStyle>
             <a:lvl1pPr marL="0" indent="0">
               <a:buNone/>
-              <a:defRPr sz="1400"/>
+              <a:defRPr sz="1200"/>
             </a:lvl1pPr>
-            <a:lvl2pPr marL="457200" indent="0">
-              <a:buNone/>
-              <a:defRPr sz="1200"/>
+            <a:lvl2pPr marL="342900" indent="0">
+              <a:buNone/>
+              <a:defRPr sz="1050"/>
             </a:lvl2pPr>
-            <a:lvl3pPr marL="914400" indent="0">
-              <a:buNone/>
-              <a:defRPr sz="1000"/>
+            <a:lvl3pPr marL="685800" indent="0">
+              <a:buNone/>
+              <a:defRPr sz="900"/>
             </a:lvl3pPr>
-            <a:lvl4pPr marL="1371600" indent="0">
-              <a:buNone/>
-              <a:defRPr sz="900"/>
+            <a:lvl4pPr marL="1028700" indent="0">
+              <a:buNone/>
+              <a:defRPr sz="750"/>
             </a:lvl4pPr>
-            <a:lvl5pPr marL="1828800" indent="0">
-              <a:buNone/>
-              <a:defRPr sz="900"/>
+            <a:lvl5pPr marL="1371600" indent="0">
+              <a:buNone/>
+              <a:defRPr sz="750"/>
             </a:lvl5pPr>
-            <a:lvl6pPr marL="2286000" indent="0">
-              <a:buNone/>
-              <a:defRPr sz="900"/>
+            <a:lvl6pPr marL="1714500" indent="0">
+              <a:buNone/>
+              <a:defRPr sz="750"/>
             </a:lvl6pPr>
-            <a:lvl7pPr marL="2743200" indent="0">
-              <a:buNone/>
-              <a:defRPr sz="900"/>
+            <a:lvl7pPr marL="2057400" indent="0">
+              <a:buNone/>
+              <a:defRPr sz="750"/>
             </a:lvl7pPr>
-            <a:lvl8pPr marL="3200400" indent="0">
-              <a:buNone/>
-              <a:defRPr sz="900"/>
+            <a:lvl8pPr marL="2400300" indent="0">
+              <a:buNone/>
+              <a:defRPr sz="750"/>
             </a:lvl8pPr>
-            <a:lvl9pPr marL="3657600" indent="0">
-              <a:buNone/>
-              <a:defRPr sz="900"/>
+            <a:lvl9pPr marL="2743200" indent="0">
+              <a:buNone/>
+              <a:defRPr sz="750"/>
             </a:lvl9pPr>
           </a:lstStyle>
           <a:p>
@@ -2586,9 +2364,9 @@
           <a:bodyPr/>
           <a:lstStyle/>
           <a:p>
-            <a:fld id="{7326E625-7DCE-4FFD-9C1E-668849BEE15C}" type="datetimeFigureOut">
-              <a:rPr lang="ru-RU" smtClean="0"/>
-              <a:t>15.05.2017</a:t>
+            <a:fld id="{B0828F7B-BD2E-4C7D-BE82-70B58EA96151}" type="datetimeFigureOut">
+              <a:rPr lang="ru-RU" smtClean="0"/>
+              <a:t>15.11.2022</a:t>
             </a:fld>
             <a:endParaRPr lang="ru-RU"/>
           </a:p>
@@ -2628,7 +2406,7 @@
           <a:bodyPr/>
           <a:lstStyle/>
           <a:p>
-            <a:fld id="{3281323C-A1B1-4E87-9113-18A81EC11C88}" type="slidenum">
+            <a:fld id="{4F023A34-82CD-4406-B56F-4524DA9D1E3A}" type="slidenum">
               <a:rPr lang="ru-RU" smtClean="0"/>
               <a:t>‹#›</a:t>
             </a:fld>
@@ -2639,7 +2417,7 @@
     </p:spTree>
     <p:extLst>
       <p:ext uri="{BB962C8B-B14F-4D97-AF65-F5344CB8AC3E}">
-        <p14:creationId xmlns:p14="http://schemas.microsoft.com/office/powerpoint/2010/main" val="2744147904"/>
+        <p14:creationId xmlns:p14="http://schemas.microsoft.com/office/powerpoint/2010/main" val="4288334073"/>
       </p:ext>
     </p:extLst>
   </p:cSld>
@@ -2683,8 +2461,8 @@
         </p:nvSpPr>
         <p:spPr>
           <a:xfrm>
-            <a:off x="457200" y="274638"/>
-            <a:ext cx="8229600" cy="1143000"/>
+            <a:off x="628650" y="365126"/>
+            <a:ext cx="7886700" cy="1325563"/>
           </a:xfrm>
           <a:prstGeom prst="rect">
             <a:avLst/>
@@ -2716,8 +2494,8 @@
         </p:nvSpPr>
         <p:spPr>
           <a:xfrm>
-            <a:off x="457200" y="1600200"/>
-            <a:ext cx="8229600" cy="4525963"/>
+            <a:off x="628650" y="1825625"/>
+            <a:ext cx="7886700" cy="4351338"/>
           </a:xfrm>
           <a:prstGeom prst="rect">
             <a:avLst/>
@@ -2778,8 +2556,8 @@
         </p:nvSpPr>
         <p:spPr>
           <a:xfrm>
-            <a:off x="457200" y="6356350"/>
-            <a:ext cx="2133600" cy="365125"/>
+            <a:off x="628650" y="6356351"/>
+            <a:ext cx="2057400" cy="365125"/>
           </a:xfrm>
           <a:prstGeom prst="rect">
             <a:avLst/>
@@ -2789,7 +2567,7 @@
           <a:bodyPr vert="horz" lIns="91440" tIns="45720" rIns="91440" bIns="45720" rtlCol="0" anchor="ctr"/>
           <a:lstStyle>
             <a:lvl1pPr algn="l">
-              <a:defRPr sz="1200">
+              <a:defRPr sz="900">
                 <a:solidFill>
                   <a:schemeClr val="tx1">
                     <a:tint val="75000"/>
@@ -2799,9 +2577,9 @@
             </a:lvl1pPr>
           </a:lstStyle>
           <a:p>
-            <a:fld id="{7326E625-7DCE-4FFD-9C1E-668849BEE15C}" type="datetimeFigureOut">
-              <a:rPr lang="ru-RU" smtClean="0"/>
-              <a:t>15.05.2017</a:t>
+            <a:fld id="{B0828F7B-BD2E-4C7D-BE82-70B58EA96151}" type="datetimeFigureOut">
+              <a:rPr lang="ru-RU" smtClean="0"/>
+              <a:t>15.11.2022</a:t>
             </a:fld>
             <a:endParaRPr lang="ru-RU"/>
           </a:p>
@@ -2819,8 +2597,8 @@
         </p:nvSpPr>
         <p:spPr>
           <a:xfrm>
-            <a:off x="3124200" y="6356350"/>
-            <a:ext cx="2895600" cy="365125"/>
+            <a:off x="3028950" y="6356351"/>
+            <a:ext cx="3086100" cy="365125"/>
           </a:xfrm>
           <a:prstGeom prst="rect">
             <a:avLst/>
@@ -2830,7 +2608,7 @@
           <a:bodyPr vert="horz" lIns="91440" tIns="45720" rIns="91440" bIns="45720" rtlCol="0" anchor="ctr"/>
           <a:lstStyle>
             <a:lvl1pPr algn="ctr">
-              <a:defRPr sz="1200">
+              <a:defRPr sz="900">
                 <a:solidFill>
                   <a:schemeClr val="tx1">
                     <a:tint val="75000"/>
@@ -2856,8 +2634,8 @@
         </p:nvSpPr>
         <p:spPr>
           <a:xfrm>
-            <a:off x="6553200" y="6356350"/>
-            <a:ext cx="2133600" cy="365125"/>
+            <a:off x="6457950" y="6356351"/>
+            <a:ext cx="2057400" cy="365125"/>
           </a:xfrm>
           <a:prstGeom prst="rect">
             <a:avLst/>
@@ -2867,7 +2645,7 @@
           <a:bodyPr vert="horz" lIns="91440" tIns="45720" rIns="91440" bIns="45720" rtlCol="0" anchor="ctr"/>
           <a:lstStyle>
             <a:lvl1pPr algn="r">
-              <a:defRPr sz="1200">
+              <a:defRPr sz="900">
                 <a:solidFill>
                   <a:schemeClr val="tx1">
                     <a:tint val="75000"/>
@@ -2877,7 +2655,7 @@
             </a:lvl1pPr>
           </a:lstStyle>
           <a:p>
-            <a:fld id="{3281323C-A1B1-4E87-9113-18A81EC11C88}" type="slidenum">
+            <a:fld id="{4F023A34-82CD-4406-B56F-4524DA9D1E3A}" type="slidenum">
               <a:rPr lang="ru-RU" smtClean="0"/>
               <a:t>‹#›</a:t>
             </a:fld>
@@ -2888,33 +2666,35 @@
     </p:spTree>
     <p:extLst>
       <p:ext uri="{BB962C8B-B14F-4D97-AF65-F5344CB8AC3E}">
-        <p14:creationId xmlns:p14="http://schemas.microsoft.com/office/powerpoint/2010/main" val="364767953"/>
+        <p14:creationId xmlns:p14="http://schemas.microsoft.com/office/powerpoint/2010/main" val="3509369354"/>
       </p:ext>
     </p:extLst>
   </p:cSld>
   <p:clrMap bg1="lt1" tx1="dk1" bg2="lt2" tx2="dk2" accent1="accent1" accent2="accent2" accent3="accent3" accent4="accent4" accent5="accent5" accent6="accent6" hlink="hlink" folHlink="folHlink"/>
   <p:sldLayoutIdLst>
-    <p:sldLayoutId id="2147483649" r:id="rId1"/>
-    <p:sldLayoutId id="2147483650" r:id="rId2"/>
-    <p:sldLayoutId id="2147483651" r:id="rId3"/>
-    <p:sldLayoutId id="2147483652" r:id="rId4"/>
-    <p:sldLayoutId id="2147483653" r:id="rId5"/>
-    <p:sldLayoutId id="2147483654" r:id="rId6"/>
-    <p:sldLayoutId id="2147483655" r:id="rId7"/>
-    <p:sldLayoutId id="2147483656" r:id="rId8"/>
-    <p:sldLayoutId id="2147483657" r:id="rId9"/>
-    <p:sldLayoutId id="2147483658" r:id="rId10"/>
-    <p:sldLayoutId id="2147483659" r:id="rId11"/>
-    <p:sldLayoutId id="2147483660" r:id="rId12"/>
+    <p:sldLayoutId id="2147483784" r:id="rId1"/>
+    <p:sldLayoutId id="2147483785" r:id="rId2"/>
+    <p:sldLayoutId id="2147483786" r:id="rId3"/>
+    <p:sldLayoutId id="2147483787" r:id="rId4"/>
+    <p:sldLayoutId id="2147483788" r:id="rId5"/>
+    <p:sldLayoutId id="2147483789" r:id="rId6"/>
+    <p:sldLayoutId id="2147483790" r:id="rId7"/>
+    <p:sldLayoutId id="2147483791" r:id="rId8"/>
+    <p:sldLayoutId id="2147483792" r:id="rId9"/>
+    <p:sldLayoutId id="2147483793" r:id="rId10"/>
+    <p:sldLayoutId id="2147483794" r:id="rId11"/>
   </p:sldLayoutIdLst>
   <p:txStyles>
     <p:titleStyle>
-      <a:lvl1pPr algn="ctr" defTabSz="914400" rtl="0" eaLnBrk="1" latinLnBrk="0" hangingPunct="1">
+      <a:lvl1pPr algn="l" defTabSz="685800" rtl="0" eaLnBrk="1" latinLnBrk="0" hangingPunct="1">
+        <a:lnSpc>
+          <a:spcPct val="90000"/>
+        </a:lnSpc>
         <a:spcBef>
           <a:spcPct val="0"/>
         </a:spcBef>
         <a:buNone/>
-        <a:defRPr sz="4400" kern="1200">
+        <a:defRPr sz="3300" kern="1200">
           <a:solidFill>
             <a:schemeClr val="tx1"/>
           </a:solidFill>
@@ -2925,13 +2705,16 @@
       </a:lvl1pPr>
     </p:titleStyle>
     <p:bodyStyle>
-      <a:lvl1pPr marL="342900" indent="-342900" algn="l" defTabSz="914400" rtl="0" eaLnBrk="1" latinLnBrk="0" hangingPunct="1">
+      <a:lvl1pPr marL="171450" indent="-171450" algn="l" defTabSz="685800" rtl="0" eaLnBrk="1" latinLnBrk="0" hangingPunct="1">
+        <a:lnSpc>
+          <a:spcPct val="90000"/>
+        </a:lnSpc>
         <a:spcBef>
-          <a:spcPct val="20000"/>
+          <a:spcPts val="750"/>
         </a:spcBef>
         <a:buFont typeface="Arial" panose="020B0604020202020204" pitchFamily="34" charset="0"/>
         <a:buChar char="•"/>
-        <a:defRPr sz="3200" kern="1200">
+        <a:defRPr sz="2100" kern="1200">
           <a:solidFill>
             <a:schemeClr val="tx1"/>
           </a:solidFill>
@@ -2940,13 +2723,16 @@
           <a:cs typeface="+mn-cs"/>
         </a:defRPr>
       </a:lvl1pPr>
-      <a:lvl2pPr marL="742950" indent="-285750" algn="l" defTabSz="914400" rtl="0" eaLnBrk="1" latinLnBrk="0" hangingPunct="1">
+      <a:lvl2pPr marL="514350" indent="-171450" algn="l" defTabSz="685800" rtl="0" eaLnBrk="1" latinLnBrk="0" hangingPunct="1">
+        <a:lnSpc>
+          <a:spcPct val="90000"/>
+        </a:lnSpc>
         <a:spcBef>
-          <a:spcPct val="20000"/>
+          <a:spcPts val="375"/>
         </a:spcBef>
         <a:buFont typeface="Arial" panose="020B0604020202020204" pitchFamily="34" charset="0"/>
-        <a:buChar char="–"/>
-        <a:defRPr sz="2800" kern="1200">
+        <a:buChar char="•"/>
+        <a:defRPr sz="1800" kern="1200">
           <a:solidFill>
             <a:schemeClr val="tx1"/>
           </a:solidFill>
@@ -2955,13 +2741,16 @@
           <a:cs typeface="+mn-cs"/>
         </a:defRPr>
       </a:lvl2pPr>
-      <a:lvl3pPr marL="1143000" indent="-228600" algn="l" defTabSz="914400" rtl="0" eaLnBrk="1" latinLnBrk="0" hangingPunct="1">
+      <a:lvl3pPr marL="857250" indent="-171450" algn="l" defTabSz="685800" rtl="0" eaLnBrk="1" latinLnBrk="0" hangingPunct="1">
+        <a:lnSpc>
+          <a:spcPct val="90000"/>
+        </a:lnSpc>
         <a:spcBef>
-          <a:spcPct val="20000"/>
+          <a:spcPts val="375"/>
         </a:spcBef>
         <a:buFont typeface="Arial" panose="020B0604020202020204" pitchFamily="34" charset="0"/>
         <a:buChar char="•"/>
-        <a:defRPr sz="2400" kern="1200">
+        <a:defRPr sz="1500" kern="1200">
           <a:solidFill>
             <a:schemeClr val="tx1"/>
           </a:solidFill>
@@ -2970,13 +2759,16 @@
           <a:cs typeface="+mn-cs"/>
         </a:defRPr>
       </a:lvl3pPr>
-      <a:lvl4pPr marL="1600200" indent="-228600" algn="l" defTabSz="914400" rtl="0" eaLnBrk="1" latinLnBrk="0" hangingPunct="1">
+      <a:lvl4pPr marL="1200150" indent="-171450" algn="l" defTabSz="685800" rtl="0" eaLnBrk="1" latinLnBrk="0" hangingPunct="1">
+        <a:lnSpc>
+          <a:spcPct val="90000"/>
+        </a:lnSpc>
         <a:spcBef>
-          <a:spcPct val="20000"/>
+          <a:spcPts val="375"/>
         </a:spcBef>
         <a:buFont typeface="Arial" panose="020B0604020202020204" pitchFamily="34" charset="0"/>
-        <a:buChar char="–"/>
-        <a:defRPr sz="2000" kern="1200">
+        <a:buChar char="•"/>
+        <a:defRPr sz="1350" kern="1200">
           <a:solidFill>
             <a:schemeClr val="tx1"/>
           </a:solidFill>
@@ -2985,13 +2777,16 @@
           <a:cs typeface="+mn-cs"/>
         </a:defRPr>
       </a:lvl4pPr>
-      <a:lvl5pPr marL="2057400" indent="-228600" algn="l" defTabSz="914400" rtl="0" eaLnBrk="1" latinLnBrk="0" hangingPunct="1">
+      <a:lvl5pPr marL="1543050" indent="-171450" algn="l" defTabSz="685800" rtl="0" eaLnBrk="1" latinLnBrk="0" hangingPunct="1">
+        <a:lnSpc>
+          <a:spcPct val="90000"/>
+        </a:lnSpc>
         <a:spcBef>
-          <a:spcPct val="20000"/>
+          <a:spcPts val="375"/>
         </a:spcBef>
         <a:buFont typeface="Arial" panose="020B0604020202020204" pitchFamily="34" charset="0"/>
-        <a:buChar char="»"/>
-        <a:defRPr sz="2000" kern="1200">
+        <a:buChar char="•"/>
+        <a:defRPr sz="1350" kern="1200">
           <a:solidFill>
             <a:schemeClr val="tx1"/>
           </a:solidFill>
@@ -3000,13 +2795,16 @@
           <a:cs typeface="+mn-cs"/>
         </a:defRPr>
       </a:lvl5pPr>
-      <a:lvl6pPr marL="2514600" indent="-228600" algn="l" defTabSz="914400" rtl="0" eaLnBrk="1" latinLnBrk="0" hangingPunct="1">
+      <a:lvl6pPr marL="1885950" indent="-171450" algn="l" defTabSz="685800" rtl="0" eaLnBrk="1" latinLnBrk="0" hangingPunct="1">
+        <a:lnSpc>
+          <a:spcPct val="90000"/>
+        </a:lnSpc>
         <a:spcBef>
-          <a:spcPct val="20000"/>
+          <a:spcPts val="375"/>
         </a:spcBef>
         <a:buFont typeface="Arial" panose="020B0604020202020204" pitchFamily="34" charset="0"/>
         <a:buChar char="•"/>
-        <a:defRPr sz="2000" kern="1200">
+        <a:defRPr sz="1350" kern="1200">
           <a:solidFill>
             <a:schemeClr val="tx1"/>
           </a:solidFill>
@@ -3015,13 +2813,16 @@
           <a:cs typeface="+mn-cs"/>
         </a:defRPr>
       </a:lvl6pPr>
-      <a:lvl7pPr marL="2971800" indent="-228600" algn="l" defTabSz="914400" rtl="0" eaLnBrk="1" latinLnBrk="0" hangingPunct="1">
+      <a:lvl7pPr marL="2228850" indent="-171450" algn="l" defTabSz="685800" rtl="0" eaLnBrk="1" latinLnBrk="0" hangingPunct="1">
+        <a:lnSpc>
+          <a:spcPct val="90000"/>
+        </a:lnSpc>
         <a:spcBef>
-          <a:spcPct val="20000"/>
+          <a:spcPts val="375"/>
         </a:spcBef>
         <a:buFont typeface="Arial" panose="020B0604020202020204" pitchFamily="34" charset="0"/>
         <a:buChar char="•"/>
-        <a:defRPr sz="2000" kern="1200">
+        <a:defRPr sz="1350" kern="1200">
           <a:solidFill>
             <a:schemeClr val="tx1"/>
           </a:solidFill>
@@ -3030,13 +2831,16 @@
           <a:cs typeface="+mn-cs"/>
         </a:defRPr>
       </a:lvl7pPr>
-      <a:lvl8pPr marL="3429000" indent="-228600" algn="l" defTabSz="914400" rtl="0" eaLnBrk="1" latinLnBrk="0" hangingPunct="1">
+      <a:lvl8pPr marL="2571750" indent="-171450" algn="l" defTabSz="685800" rtl="0" eaLnBrk="1" latinLnBrk="0" hangingPunct="1">
+        <a:lnSpc>
+          <a:spcPct val="90000"/>
+        </a:lnSpc>
         <a:spcBef>
-          <a:spcPct val="20000"/>
+          <a:spcPts val="375"/>
         </a:spcBef>
         <a:buFont typeface="Arial" panose="020B0604020202020204" pitchFamily="34" charset="0"/>
         <a:buChar char="•"/>
-        <a:defRPr sz="2000" kern="1200">
+        <a:defRPr sz="1350" kern="1200">
           <a:solidFill>
             <a:schemeClr val="tx1"/>
           </a:solidFill>
@@ -3045,13 +2849,16 @@
           <a:cs typeface="+mn-cs"/>
         </a:defRPr>
       </a:lvl8pPr>
-      <a:lvl9pPr marL="3886200" indent="-228600" algn="l" defTabSz="914400" rtl="0" eaLnBrk="1" latinLnBrk="0" hangingPunct="1">
+      <a:lvl9pPr marL="2914650" indent="-171450" algn="l" defTabSz="685800" rtl="0" eaLnBrk="1" latinLnBrk="0" hangingPunct="1">
+        <a:lnSpc>
+          <a:spcPct val="90000"/>
+        </a:lnSpc>
         <a:spcBef>
-          <a:spcPct val="20000"/>
+          <a:spcPts val="375"/>
         </a:spcBef>
         <a:buFont typeface="Arial" panose="020B0604020202020204" pitchFamily="34" charset="0"/>
         <a:buChar char="•"/>
-        <a:defRPr sz="2000" kern="1200">
+        <a:defRPr sz="1350" kern="1200">
           <a:solidFill>
             <a:schemeClr val="tx1"/>
           </a:solidFill>
@@ -3065,8 +2872,8 @@
       <a:defPPr>
         <a:defRPr lang="ru-RU"/>
       </a:defPPr>
-      <a:lvl1pPr marL="0" algn="l" defTabSz="914400" rtl="0" eaLnBrk="1" latinLnBrk="0" hangingPunct="1">
-        <a:defRPr sz="1800" kern="1200">
+      <a:lvl1pPr marL="0" algn="l" defTabSz="685800" rtl="0" eaLnBrk="1" latinLnBrk="0" hangingPunct="1">
+        <a:defRPr sz="1350" kern="1200">
           <a:solidFill>
             <a:schemeClr val="tx1"/>
           </a:solidFill>
@@ -3075,8 +2882,8 @@
           <a:cs typeface="+mn-cs"/>
         </a:defRPr>
       </a:lvl1pPr>
-      <a:lvl2pPr marL="457200" algn="l" defTabSz="914400" rtl="0" eaLnBrk="1" latinLnBrk="0" hangingPunct="1">
-        <a:defRPr sz="1800" kern="1200">
+      <a:lvl2pPr marL="342900" algn="l" defTabSz="685800" rtl="0" eaLnBrk="1" latinLnBrk="0" hangingPunct="1">
+        <a:defRPr sz="1350" kern="1200">
           <a:solidFill>
             <a:schemeClr val="tx1"/>
           </a:solidFill>
@@ -3085,8 +2892,8 @@
           <a:cs typeface="+mn-cs"/>
         </a:defRPr>
       </a:lvl2pPr>
-      <a:lvl3pPr marL="914400" algn="l" defTabSz="914400" rtl="0" eaLnBrk="1" latinLnBrk="0" hangingPunct="1">
-        <a:defRPr sz="1800" kern="1200">
+      <a:lvl3pPr marL="685800" algn="l" defTabSz="685800" rtl="0" eaLnBrk="1" latinLnBrk="0" hangingPunct="1">
+        <a:defRPr sz="1350" kern="1200">
           <a:solidFill>
             <a:schemeClr val="tx1"/>
           </a:solidFill>
@@ -3095,8 +2902,8 @@
           <a:cs typeface="+mn-cs"/>
         </a:defRPr>
       </a:lvl3pPr>
-      <a:lvl4pPr marL="1371600" algn="l" defTabSz="914400" rtl="0" eaLnBrk="1" latinLnBrk="0" hangingPunct="1">
-        <a:defRPr sz="1800" kern="1200">
+      <a:lvl4pPr marL="1028700" algn="l" defTabSz="685800" rtl="0" eaLnBrk="1" latinLnBrk="0" hangingPunct="1">
+        <a:defRPr sz="1350" kern="1200">
           <a:solidFill>
             <a:schemeClr val="tx1"/>
           </a:solidFill>
@@ -3105,8 +2912,8 @@
           <a:cs typeface="+mn-cs"/>
         </a:defRPr>
       </a:lvl4pPr>
-      <a:lvl5pPr marL="1828800" algn="l" defTabSz="914400" rtl="0" eaLnBrk="1" latinLnBrk="0" hangingPunct="1">
-        <a:defRPr sz="1800" kern="1200">
+      <a:lvl5pPr marL="1371600" algn="l" defTabSz="685800" rtl="0" eaLnBrk="1" latinLnBrk="0" hangingPunct="1">
+        <a:defRPr sz="1350" kern="1200">
           <a:solidFill>
             <a:schemeClr val="tx1"/>
           </a:solidFill>
@@ -3115,8 +2922,8 @@
           <a:cs typeface="+mn-cs"/>
         </a:defRPr>
       </a:lvl5pPr>
-      <a:lvl6pPr marL="2286000" algn="l" defTabSz="914400" rtl="0" eaLnBrk="1" latinLnBrk="0" hangingPunct="1">
-        <a:defRPr sz="1800" kern="1200">
+      <a:lvl6pPr marL="1714500" algn="l" defTabSz="685800" rtl="0" eaLnBrk="1" latinLnBrk="0" hangingPunct="1">
+        <a:defRPr sz="1350" kern="1200">
           <a:solidFill>
             <a:schemeClr val="tx1"/>
           </a:solidFill>
@@ -3125,8 +2932,8 @@
           <a:cs typeface="+mn-cs"/>
         </a:defRPr>
       </a:lvl6pPr>
-      <a:lvl7pPr marL="2743200" algn="l" defTabSz="914400" rtl="0" eaLnBrk="1" latinLnBrk="0" hangingPunct="1">
-        <a:defRPr sz="1800" kern="1200">
+      <a:lvl7pPr marL="2057400" algn="l" defTabSz="685800" rtl="0" eaLnBrk="1" latinLnBrk="0" hangingPunct="1">
+        <a:defRPr sz="1350" kern="1200">
           <a:solidFill>
             <a:schemeClr val="tx1"/>
           </a:solidFill>
@@ -3135,8 +2942,8 @@
           <a:cs typeface="+mn-cs"/>
         </a:defRPr>
       </a:lvl7pPr>
-      <a:lvl8pPr marL="3200400" algn="l" defTabSz="914400" rtl="0" eaLnBrk="1" latinLnBrk="0" hangingPunct="1">
-        <a:defRPr sz="1800" kern="1200">
+      <a:lvl8pPr marL="2400300" algn="l" defTabSz="685800" rtl="0" eaLnBrk="1" latinLnBrk="0" hangingPunct="1">
+        <a:defRPr sz="1350" kern="1200">
           <a:solidFill>
             <a:schemeClr val="tx1"/>
           </a:solidFill>
@@ -3145,8 +2952,8 @@
           <a:cs typeface="+mn-cs"/>
         </a:defRPr>
       </a:lvl8pPr>
-      <a:lvl9pPr marL="3657600" algn="l" defTabSz="914400" rtl="0" eaLnBrk="1" latinLnBrk="0" hangingPunct="1">
-        <a:defRPr sz="1800" kern="1200">
+      <a:lvl9pPr marL="2743200" algn="l" defTabSz="685800" rtl="0" eaLnBrk="1" latinLnBrk="0" hangingPunct="1">
+        <a:defRPr sz="1350" kern="1200">
           <a:solidFill>
             <a:schemeClr val="tx1"/>
           </a:solidFill>
@@ -3157,6 +2964,11 @@
       </a:lvl9pPr>
     </p:otherStyle>
   </p:txStyles>
+  <p:extLst>
+    <p:ext uri="{27BBF7A9-308A-43DC-89C8-2F10F3537804}">
+      <p15:sldGuideLst xmlns:p15="http://schemas.microsoft.com/office/powerpoint/2012/main"/>
+    </p:ext>
+  </p:extLst>
 </p:sldMaster>
 </file>
 
@@ -3179,62 +2991,23 @@
       </p:grpSpPr>
       <p:sp>
         <p:nvSpPr>
-          <p:cNvPr id="2" name="Заголовок 1"/>
-          <p:cNvSpPr>
-            <a:spLocks noGrp="1"/>
-          </p:cNvSpPr>
-          <p:nvPr>
-            <p:ph type="title"/>
-          </p:nvPr>
-        </p:nvSpPr>
-        <p:spPr>
-          <a:xfrm>
-            <a:off x="293912" y="12998"/>
-            <a:ext cx="8856984" cy="648072"/>
-          </a:xfrm>
-        </p:spPr>
-        <p:txBody>
-          <a:bodyPr>
-            <a:normAutofit/>
-          </a:bodyPr>
-          <a:lstStyle/>
-          <a:p>
-            <a:r>
-              <a:rPr lang="ru-RU" sz="2000" dirty="0" smtClean="0">
-                <a:latin typeface="Times New Roman" panose="02020603050405020304" pitchFamily="18" charset="0"/>
-                <a:cs typeface="Times New Roman" panose="02020603050405020304" pitchFamily="18" charset="0"/>
-              </a:rPr>
-              <a:t>Механизм оценки персонала в ЦОК.</a:t>
-            </a:r>
-            <a:endParaRPr lang="ru-RU" sz="2000" dirty="0">
-              <a:latin typeface="Times New Roman" panose="02020603050405020304" pitchFamily="18" charset="0"/>
-              <a:cs typeface="Times New Roman" panose="02020603050405020304" pitchFamily="18" charset="0"/>
-            </a:endParaRPr>
-          </a:p>
-        </p:txBody>
-      </p:sp>
-      <p:sp>
-        <p:nvSpPr>
-          <p:cNvPr id="14" name="Скругленный прямоугольник 13"/>
+          <p:cNvPr id="5" name="Скругленный прямоугольник 4"/>
           <p:cNvSpPr/>
           <p:nvPr/>
         </p:nvSpPr>
         <p:spPr>
           <a:xfrm>
-            <a:off x="4550534" y="995830"/>
-            <a:ext cx="4273479" cy="5302999"/>
+            <a:off x="4032068" y="0"/>
+            <a:ext cx="931818" cy="313508"/>
           </a:xfrm>
           <a:prstGeom prst="roundRect">
             <a:avLst/>
           </a:prstGeom>
-          <a:solidFill>
-            <a:schemeClr val="bg1"/>
-          </a:solidFill>
-          <a:ln w="31750">
+          <a:noFill/>
+          <a:ln>
             <a:solidFill>
-              <a:srgbClr val="00B050"/>
+              <a:srgbClr val="FFC000"/>
             </a:solidFill>
-            <a:prstDash val="dash"/>
           </a:ln>
         </p:spPr>
         <p:style>
@@ -3258,32 +3031,41 @@
           <a:lstStyle/>
           <a:p>
             <a:pPr algn="ctr"/>
-            <a:endParaRPr lang="ru-RU"/>
-          </a:p>
-        </p:txBody>
-      </p:sp>
-      <p:sp>
-        <p:nvSpPr>
-          <p:cNvPr id="15" name="Скругленный прямоугольник 14"/>
+            <a:r>
+              <a:rPr lang="ru-RU" sz="1400" dirty="0" smtClean="0">
+                <a:solidFill>
+                  <a:schemeClr val="tx1"/>
+                </a:solidFill>
+              </a:rPr>
+              <a:t>Вход</a:t>
+            </a:r>
+            <a:endParaRPr lang="ru-RU" dirty="0">
+              <a:solidFill>
+                <a:schemeClr val="tx1"/>
+              </a:solidFill>
+            </a:endParaRPr>
+          </a:p>
+        </p:txBody>
+      </p:sp>
+      <p:sp>
+        <p:nvSpPr>
+          <p:cNvPr id="7" name="Скругленный прямоугольник 6"/>
           <p:cNvSpPr/>
           <p:nvPr/>
         </p:nvSpPr>
         <p:spPr>
           <a:xfrm>
-            <a:off x="262517" y="995831"/>
-            <a:ext cx="4165467" cy="5302999"/>
+            <a:off x="3860615" y="483826"/>
+            <a:ext cx="1274718" cy="368329"/>
           </a:xfrm>
           <a:prstGeom prst="roundRect">
             <a:avLst/>
           </a:prstGeom>
-          <a:solidFill>
-            <a:schemeClr val="bg1"/>
-          </a:solidFill>
-          <a:ln w="31750">
+          <a:noFill/>
+          <a:ln>
             <a:solidFill>
-              <a:srgbClr val="0070C0"/>
+              <a:srgbClr val="FFC000"/>
             </a:solidFill>
-            <a:prstDash val="dash"/>
           </a:ln>
         </p:spPr>
         <p:style>
@@ -3307,77 +3089,43 @@
           <a:lstStyle/>
           <a:p>
             <a:pPr algn="ctr"/>
-            <a:endParaRPr lang="ru-RU"/>
-          </a:p>
-        </p:txBody>
-      </p:sp>
-      <p:sp>
-        <p:nvSpPr>
-          <p:cNvPr id="16" name="Овал 15"/>
-          <p:cNvSpPr/>
-          <p:nvPr/>
-        </p:nvSpPr>
-        <p:spPr>
-          <a:xfrm>
-            <a:off x="7308304" y="5623844"/>
-            <a:ext cx="216024" cy="180020"/>
-          </a:xfrm>
-          <a:prstGeom prst="ellipse">
-            <a:avLst/>
-          </a:prstGeom>
-          <a:solidFill>
-            <a:schemeClr val="bg1"/>
-          </a:solidFill>
-        </p:spPr>
-        <p:txBody>
-          <a:bodyPr wrap="square" rtlCol="0" anchor="ctr">
-            <a:spAutoFit/>
-          </a:bodyPr>
-          <a:lstStyle/>
-          <a:p>
-            <a:pPr marL="285750" indent="-285750" algn="just">
-              <a:spcBef>
-                <a:spcPct val="0"/>
-              </a:spcBef>
-              <a:buClr>
-                <a:srgbClr val="00AEEF"/>
-              </a:buClr>
-              <a:buFont typeface="Wingdings" pitchFamily="2" charset="2"/>
-              <a:buChar char="ü"/>
-            </a:pPr>
-            <a:endParaRPr lang="ru-RU" sz="1400" dirty="0" smtClean="0">
+            <a:r>
+              <a:rPr lang="ru-RU" sz="900" dirty="0" smtClean="0">
+                <a:solidFill>
+                  <a:schemeClr val="tx1"/>
+                </a:solidFill>
+              </a:rPr>
+              <a:t>Прием заявительных документов</a:t>
+            </a:r>
+            <a:endParaRPr lang="ru-RU" sz="900" dirty="0">
               <a:solidFill>
                 <a:schemeClr val="tx1"/>
               </a:solidFill>
-              <a:latin typeface="Times New Roman" pitchFamily="18" charset="0"/>
-              <a:ea typeface="Times New Roman" pitchFamily="18" charset="0"/>
-              <a:cs typeface="Times New Roman" pitchFamily="18" charset="0"/>
             </a:endParaRPr>
           </a:p>
         </p:txBody>
       </p:sp>
       <p:sp>
         <p:nvSpPr>
-          <p:cNvPr id="18" name="Прямоугольник 17"/>
+          <p:cNvPr id="8" name="Скругленный прямоугольник 7"/>
           <p:cNvSpPr/>
           <p:nvPr/>
         </p:nvSpPr>
         <p:spPr>
           <a:xfrm>
-            <a:off x="94438" y="6396698"/>
-            <a:ext cx="1260866" cy="339218"/>
-          </a:xfrm>
-          <a:prstGeom prst="rect">
+            <a:off x="3653783" y="1060095"/>
+            <a:ext cx="1688376" cy="402271"/>
+          </a:xfrm>
+          <a:prstGeom prst="roundRect">
             <a:avLst/>
           </a:prstGeom>
-          <a:solidFill>
-            <a:srgbClr val="CCFFCC"/>
-          </a:solidFill>
+          <a:noFill/>
           <a:ln>
             <a:solidFill>
-              <a:srgbClr val="CCFFCC"/>
+              <a:srgbClr val="FFC000"/>
             </a:solidFill>
           </a:ln>
+          <a:effectLst/>
         </p:spPr>
         <p:style>
           <a:lnRef idx="2">
@@ -3403,20 +3151,22 @@
             <a:r>
               <a:rPr lang="ru-RU" sz="800" dirty="0" smtClean="0">
                 <a:solidFill>
-                  <a:schemeClr val="tx1">
-                    <a:lumMod val="75000"/>
-                    <a:lumOff val="25000"/>
-                  </a:schemeClr>
+                  <a:schemeClr val="tx1"/>
                 </a:solidFill>
               </a:rPr>
-              <a:t>Очный формат прохождения этапа</a:t>
+              <a:t>Ознакомление с процедурой </a:t>
+            </a:r>
+            <a:r>
+              <a:rPr lang="ru-RU" sz="800" dirty="0" smtClean="0">
+                <a:solidFill>
+                  <a:schemeClr val="tx1"/>
+                </a:solidFill>
+              </a:rPr>
+              <a:t>профессионального экзамена</a:t>
             </a:r>
             <a:endParaRPr lang="ru-RU" sz="800" dirty="0">
               <a:solidFill>
-                <a:schemeClr val="tx1">
-                  <a:lumMod val="75000"/>
-                  <a:lumOff val="25000"/>
-                </a:schemeClr>
+                <a:schemeClr val="tx1"/>
               </a:solidFill>
             </a:endParaRPr>
           </a:p>
@@ -3424,32 +3174,25 @@
       </p:sp>
       <p:sp>
         <p:nvSpPr>
-          <p:cNvPr id="19" name="Прямоугольник 18"/>
+          <p:cNvPr id="9" name="Скругленный прямоугольник 8"/>
           <p:cNvSpPr/>
           <p:nvPr/>
         </p:nvSpPr>
         <p:spPr>
           <a:xfrm>
-            <a:off x="1475656" y="6396698"/>
-            <a:ext cx="1260866" cy="339218"/>
-          </a:xfrm>
-          <a:prstGeom prst="rect">
+            <a:off x="3892179" y="1694961"/>
+            <a:ext cx="1211584" cy="363473"/>
+          </a:xfrm>
+          <a:prstGeom prst="roundRect">
             <a:avLst/>
           </a:prstGeom>
-          <a:solidFill>
-            <a:schemeClr val="accent6">
-              <a:lumMod val="20000"/>
-              <a:lumOff val="80000"/>
-            </a:schemeClr>
-          </a:solidFill>
+          <a:noFill/>
           <a:ln>
             <a:solidFill>
-              <a:schemeClr val="accent6">
-                <a:lumMod val="20000"/>
-                <a:lumOff val="80000"/>
-              </a:schemeClr>
+              <a:srgbClr val="FFC000"/>
             </a:solidFill>
           </a:ln>
+          <a:effectLst/>
         </p:spPr>
         <p:style>
           <a:lnRef idx="2">
@@ -3473,52 +3216,1014 @@
           <a:p>
             <a:pPr algn="ctr"/>
             <a:r>
+              <a:rPr lang="ru-RU" sz="900" dirty="0" smtClean="0">
+                <a:solidFill>
+                  <a:schemeClr val="tx1"/>
+                </a:solidFill>
+              </a:rPr>
+              <a:t>Профессиональный э</a:t>
+            </a:r>
+            <a:r>
+              <a:rPr lang="ru-RU" sz="900" dirty="0" smtClean="0">
+                <a:solidFill>
+                  <a:schemeClr val="tx1"/>
+                </a:solidFill>
+              </a:rPr>
+              <a:t>кзамен</a:t>
+            </a:r>
+            <a:endParaRPr lang="ru-RU" sz="900" dirty="0">
+              <a:solidFill>
+                <a:schemeClr val="tx1"/>
+              </a:solidFill>
+            </a:endParaRPr>
+          </a:p>
+        </p:txBody>
+      </p:sp>
+      <p:sp>
+        <p:nvSpPr>
+          <p:cNvPr id="10" name="Скругленный прямоугольник 9"/>
+          <p:cNvSpPr/>
+          <p:nvPr/>
+        </p:nvSpPr>
+        <p:spPr>
+          <a:xfrm>
+            <a:off x="3256185" y="2368732"/>
+            <a:ext cx="2483579" cy="557348"/>
+          </a:xfrm>
+          <a:prstGeom prst="roundRect">
+            <a:avLst/>
+          </a:prstGeom>
+          <a:noFill/>
+          <a:ln>
+            <a:solidFill>
+              <a:schemeClr val="accent6">
+                <a:lumMod val="60000"/>
+                <a:lumOff val="40000"/>
+              </a:schemeClr>
+            </a:solidFill>
+          </a:ln>
+          <a:effectLst/>
+        </p:spPr>
+        <p:style>
+          <a:lnRef idx="2">
+            <a:schemeClr val="accent1">
+              <a:shade val="50000"/>
+            </a:schemeClr>
+          </a:lnRef>
+          <a:fillRef idx="1">
+            <a:schemeClr val="accent1"/>
+          </a:fillRef>
+          <a:effectRef idx="0">
+            <a:schemeClr val="accent1"/>
+          </a:effectRef>
+          <a:fontRef idx="minor">
+            <a:schemeClr val="lt1"/>
+          </a:fontRef>
+        </p:style>
+        <p:txBody>
+          <a:bodyPr rtlCol="0" anchor="ctr"/>
+          <a:lstStyle/>
+          <a:p>
+            <a:pPr algn="ctr"/>
+            <a:r>
               <a:rPr lang="ru-RU" sz="800" dirty="0" smtClean="0">
                 <a:solidFill>
-                  <a:schemeClr val="tx1">
-                    <a:lumMod val="75000"/>
-                    <a:lumOff val="25000"/>
-                  </a:schemeClr>
+                  <a:schemeClr val="tx1"/>
                 </a:solidFill>
               </a:rPr>
-              <a:t>Возможен заочный формат прохождения этапа</a:t>
+              <a:t>Оформление комплекта </a:t>
+            </a:r>
+            <a:r>
+              <a:rPr lang="ru-RU" sz="800" dirty="0">
+                <a:solidFill>
+                  <a:schemeClr val="tx1"/>
+                </a:solidFill>
+              </a:rPr>
+              <a:t>документов и представление к заседанию СПК</a:t>
+            </a:r>
+          </a:p>
+          <a:p>
+            <a:pPr algn="ctr"/>
+            <a:r>
+              <a:rPr lang="ru-RU" sz="800" dirty="0" smtClean="0">
+                <a:solidFill>
+                  <a:schemeClr val="tx1"/>
+                </a:solidFill>
+              </a:rPr>
+              <a:t> </a:t>
+            </a:r>
+            <a:r>
+              <a:rPr lang="ru-RU" sz="800" dirty="0" smtClean="0">
+                <a:solidFill>
+                  <a:schemeClr val="tx1"/>
+                </a:solidFill>
+              </a:rPr>
+              <a:t>по итогам </a:t>
+            </a:r>
+            <a:r>
+              <a:rPr lang="ru-RU" sz="800" dirty="0" smtClean="0">
+                <a:solidFill>
+                  <a:schemeClr val="tx1"/>
+                </a:solidFill>
+              </a:rPr>
+              <a:t>экзамена</a:t>
             </a:r>
             <a:endParaRPr lang="ru-RU" sz="800" dirty="0">
               <a:solidFill>
-                <a:schemeClr val="tx1">
-                  <a:lumMod val="75000"/>
-                  <a:lumOff val="25000"/>
-                </a:schemeClr>
+                <a:schemeClr val="tx1"/>
               </a:solidFill>
             </a:endParaRPr>
           </a:p>
         </p:txBody>
       </p:sp>
-      <p:pic>
-        <p:nvPicPr>
-          <p:cNvPr id="20" name="Picture 2"/>
-          <p:cNvPicPr>
-            <a:picLocks noChangeAspect="1" noChangeArrowheads="1"/>
-          </p:cNvPicPr>
+      <p:sp>
+        <p:nvSpPr>
+          <p:cNvPr id="11" name="Ромб 10"/>
+          <p:cNvSpPr/>
           <p:nvPr/>
-        </p:nvPicPr>
-        <p:blipFill>
-          <a:blip r:embed="rId2" cstate="print">
-            <a:extLst>
-              <a:ext uri="{28A0092B-C50C-407E-A947-70E740481C1C}">
-                <a14:useLocalDpi xmlns:a14="http://schemas.microsoft.com/office/drawing/2010/main" val="0"/>
-              </a:ext>
-            </a:extLst>
-          </a:blip>
-          <a:srcRect/>
-          <a:stretch>
-            <a:fillRect/>
-          </a:stretch>
-        </p:blipFill>
-        <p:spPr bwMode="auto">
+        </p:nvSpPr>
+        <p:spPr>
           <a:xfrm>
-            <a:off x="276303" y="1133675"/>
-            <a:ext cx="8159171" cy="5141119"/>
+            <a:off x="3491318" y="3048000"/>
+            <a:ext cx="2013312" cy="1480458"/>
+          </a:xfrm>
+          <a:prstGeom prst="diamond">
+            <a:avLst/>
+          </a:prstGeom>
+          <a:noFill/>
+          <a:ln>
+            <a:solidFill>
+              <a:srgbClr val="FFC000"/>
+            </a:solidFill>
+          </a:ln>
+          <a:effectLst/>
+        </p:spPr>
+        <p:style>
+          <a:lnRef idx="2">
+            <a:schemeClr val="accent1">
+              <a:shade val="50000"/>
+            </a:schemeClr>
+          </a:lnRef>
+          <a:fillRef idx="1">
+            <a:schemeClr val="accent1"/>
+          </a:fillRef>
+          <a:effectRef idx="0">
+            <a:schemeClr val="accent1"/>
+          </a:effectRef>
+          <a:fontRef idx="minor">
+            <a:schemeClr val="lt1"/>
+          </a:fontRef>
+        </p:style>
+        <p:txBody>
+          <a:bodyPr rtlCol="0" anchor="ctr"/>
+          <a:lstStyle/>
+          <a:p>
+            <a:pPr algn="ctr"/>
+            <a:endParaRPr lang="ru-RU" sz="1400"/>
+          </a:p>
+        </p:txBody>
+      </p:sp>
+      <p:sp>
+        <p:nvSpPr>
+          <p:cNvPr id="13" name="TextBox 12"/>
+          <p:cNvSpPr txBox="1"/>
+          <p:nvPr/>
+        </p:nvSpPr>
+        <p:spPr>
+          <a:xfrm>
+            <a:off x="4209273" y="3603563"/>
+            <a:ext cx="577402" cy="369332"/>
+          </a:xfrm>
+          <a:prstGeom prst="rect">
+            <a:avLst/>
+          </a:prstGeom>
+          <a:noFill/>
+        </p:spPr>
+        <p:txBody>
+          <a:bodyPr wrap="none" rtlCol="0">
+            <a:spAutoFit/>
+          </a:bodyPr>
+          <a:lstStyle/>
+          <a:p>
+            <a:r>
+              <a:rPr lang="ru-RU" dirty="0" smtClean="0"/>
+              <a:t>СПК</a:t>
+            </a:r>
+            <a:endParaRPr lang="ru-RU" dirty="0"/>
+          </a:p>
+        </p:txBody>
+      </p:sp>
+      <p:sp>
+        <p:nvSpPr>
+          <p:cNvPr id="14" name="Скругленный прямоугольник 13"/>
+          <p:cNvSpPr/>
+          <p:nvPr/>
+        </p:nvSpPr>
+        <p:spPr>
+          <a:xfrm>
+            <a:off x="566044" y="3535678"/>
+            <a:ext cx="1419497" cy="505097"/>
+          </a:xfrm>
+          <a:prstGeom prst="roundRect">
+            <a:avLst/>
+          </a:prstGeom>
+          <a:noFill/>
+          <a:ln>
+            <a:solidFill>
+              <a:srgbClr val="FFC000"/>
+            </a:solidFill>
+          </a:ln>
+        </p:spPr>
+        <p:style>
+          <a:lnRef idx="2">
+            <a:schemeClr val="accent1">
+              <a:shade val="50000"/>
+            </a:schemeClr>
+          </a:lnRef>
+          <a:fillRef idx="1">
+            <a:schemeClr val="accent1"/>
+          </a:fillRef>
+          <a:effectRef idx="0">
+            <a:schemeClr val="accent1"/>
+          </a:effectRef>
+          <a:fontRef idx="minor">
+            <a:schemeClr val="lt1"/>
+          </a:fontRef>
+        </p:style>
+        <p:txBody>
+          <a:bodyPr rtlCol="0" anchor="ctr"/>
+          <a:lstStyle/>
+          <a:p>
+            <a:pPr algn="ctr"/>
+            <a:r>
+              <a:rPr lang="ru-RU" sz="1400" dirty="0" smtClean="0">
+                <a:solidFill>
+                  <a:schemeClr val="tx1"/>
+                </a:solidFill>
+              </a:rPr>
+              <a:t>Реестр НОК</a:t>
+            </a:r>
+            <a:endParaRPr lang="ru-RU" sz="1400" dirty="0">
+              <a:solidFill>
+                <a:schemeClr val="tx1"/>
+              </a:solidFill>
+            </a:endParaRPr>
+          </a:p>
+        </p:txBody>
+      </p:sp>
+      <p:sp>
+        <p:nvSpPr>
+          <p:cNvPr id="15" name="Скругленный прямоугольник 14"/>
+          <p:cNvSpPr/>
+          <p:nvPr/>
+        </p:nvSpPr>
+        <p:spPr>
+          <a:xfrm>
+            <a:off x="7149824" y="3535679"/>
+            <a:ext cx="1419497" cy="505097"/>
+          </a:xfrm>
+          <a:prstGeom prst="roundRect">
+            <a:avLst/>
+          </a:prstGeom>
+          <a:noFill/>
+          <a:ln>
+            <a:solidFill>
+              <a:srgbClr val="FFC000"/>
+            </a:solidFill>
+          </a:ln>
+        </p:spPr>
+        <p:style>
+          <a:lnRef idx="2">
+            <a:schemeClr val="accent1">
+              <a:shade val="50000"/>
+            </a:schemeClr>
+          </a:lnRef>
+          <a:fillRef idx="1">
+            <a:schemeClr val="accent1"/>
+          </a:fillRef>
+          <a:effectRef idx="0">
+            <a:schemeClr val="accent1"/>
+          </a:effectRef>
+          <a:fontRef idx="minor">
+            <a:schemeClr val="lt1"/>
+          </a:fontRef>
+        </p:style>
+        <p:txBody>
+          <a:bodyPr rtlCol="0" anchor="ctr"/>
+          <a:lstStyle/>
+          <a:p>
+            <a:pPr algn="ctr"/>
+            <a:r>
+              <a:rPr lang="ru-RU" sz="1400" dirty="0" smtClean="0">
+                <a:solidFill>
+                  <a:schemeClr val="tx1"/>
+                </a:solidFill>
+              </a:rPr>
+              <a:t>Реестр НОК</a:t>
+            </a:r>
+            <a:endParaRPr lang="ru-RU" sz="1400" dirty="0">
+              <a:solidFill>
+                <a:schemeClr val="tx1"/>
+              </a:solidFill>
+            </a:endParaRPr>
+          </a:p>
+        </p:txBody>
+      </p:sp>
+      <p:sp>
+        <p:nvSpPr>
+          <p:cNvPr id="16" name="Скругленный прямоугольник 15"/>
+          <p:cNvSpPr/>
+          <p:nvPr/>
+        </p:nvSpPr>
+        <p:spPr>
+          <a:xfrm>
+            <a:off x="272696" y="4341882"/>
+            <a:ext cx="2006191" cy="687999"/>
+          </a:xfrm>
+          <a:prstGeom prst="roundRect">
+            <a:avLst/>
+          </a:prstGeom>
+          <a:noFill/>
+          <a:ln>
+            <a:solidFill>
+              <a:srgbClr val="FFC000"/>
+            </a:solidFill>
+          </a:ln>
+        </p:spPr>
+        <p:style>
+          <a:lnRef idx="2">
+            <a:schemeClr val="accent1">
+              <a:shade val="50000"/>
+            </a:schemeClr>
+          </a:lnRef>
+          <a:fillRef idx="1">
+            <a:schemeClr val="accent1"/>
+          </a:fillRef>
+          <a:effectRef idx="0">
+            <a:schemeClr val="accent1"/>
+          </a:effectRef>
+          <a:fontRef idx="minor">
+            <a:schemeClr val="lt1"/>
+          </a:fontRef>
+        </p:style>
+        <p:txBody>
+          <a:bodyPr rtlCol="0" anchor="ctr"/>
+          <a:lstStyle/>
+          <a:p>
+            <a:pPr algn="ctr"/>
+            <a:r>
+              <a:rPr lang="ru-RU" sz="1050" dirty="0" smtClean="0">
+                <a:solidFill>
+                  <a:schemeClr val="tx1"/>
+                </a:solidFill>
+              </a:rPr>
+              <a:t>Заключение о прохождении профессионального экзамена</a:t>
+            </a:r>
+            <a:endParaRPr lang="ru-RU" sz="1050" dirty="0">
+              <a:solidFill>
+                <a:schemeClr val="tx1"/>
+              </a:solidFill>
+            </a:endParaRPr>
+          </a:p>
+        </p:txBody>
+      </p:sp>
+      <p:sp>
+        <p:nvSpPr>
+          <p:cNvPr id="17" name="Скругленный прямоугольник 16"/>
+          <p:cNvSpPr/>
+          <p:nvPr/>
+        </p:nvSpPr>
+        <p:spPr>
+          <a:xfrm>
+            <a:off x="6908164" y="4439194"/>
+            <a:ext cx="1902816" cy="505097"/>
+          </a:xfrm>
+          <a:prstGeom prst="roundRect">
+            <a:avLst/>
+          </a:prstGeom>
+          <a:noFill/>
+          <a:ln>
+            <a:solidFill>
+              <a:srgbClr val="FFC000"/>
+            </a:solidFill>
+          </a:ln>
+        </p:spPr>
+        <p:style>
+          <a:lnRef idx="2">
+            <a:schemeClr val="accent1">
+              <a:shade val="50000"/>
+            </a:schemeClr>
+          </a:lnRef>
+          <a:fillRef idx="1">
+            <a:schemeClr val="accent1"/>
+          </a:fillRef>
+          <a:effectRef idx="0">
+            <a:schemeClr val="accent1"/>
+          </a:effectRef>
+          <a:fontRef idx="minor">
+            <a:schemeClr val="lt1"/>
+          </a:fontRef>
+        </p:style>
+        <p:txBody>
+          <a:bodyPr rtlCol="0" anchor="ctr"/>
+          <a:lstStyle/>
+          <a:p>
+            <a:pPr algn="ctr"/>
+            <a:r>
+              <a:rPr lang="ru-RU" sz="1050" dirty="0" smtClean="0">
+                <a:solidFill>
+                  <a:schemeClr val="tx1"/>
+                </a:solidFill>
+              </a:rPr>
+              <a:t>Свидетельство</a:t>
+            </a:r>
+            <a:r>
+              <a:rPr lang="en-US" sz="1050" dirty="0" smtClean="0">
+                <a:solidFill>
+                  <a:schemeClr val="tx1"/>
+                </a:solidFill>
+              </a:rPr>
+              <a:t> </a:t>
+            </a:r>
+            <a:r>
+              <a:rPr lang="ru-RU" sz="1050" dirty="0" smtClean="0">
+                <a:solidFill>
+                  <a:schemeClr val="tx1"/>
+                </a:solidFill>
+              </a:rPr>
+              <a:t>о квалификации</a:t>
+            </a:r>
+            <a:endParaRPr lang="ru-RU" sz="1050" dirty="0">
+              <a:solidFill>
+                <a:schemeClr val="tx1"/>
+              </a:solidFill>
+            </a:endParaRPr>
+          </a:p>
+        </p:txBody>
+      </p:sp>
+      <p:sp>
+        <p:nvSpPr>
+          <p:cNvPr id="18" name="Скругленный прямоугольник 17"/>
+          <p:cNvSpPr/>
+          <p:nvPr/>
+        </p:nvSpPr>
+        <p:spPr>
+          <a:xfrm>
+            <a:off x="3861163" y="6242261"/>
+            <a:ext cx="1419497" cy="505097"/>
+          </a:xfrm>
+          <a:prstGeom prst="roundRect">
+            <a:avLst/>
+          </a:prstGeom>
+          <a:noFill/>
+          <a:ln>
+            <a:solidFill>
+              <a:srgbClr val="FFC000"/>
+            </a:solidFill>
+          </a:ln>
+        </p:spPr>
+        <p:style>
+          <a:lnRef idx="2">
+            <a:schemeClr val="accent1">
+              <a:shade val="50000"/>
+            </a:schemeClr>
+          </a:lnRef>
+          <a:fillRef idx="1">
+            <a:schemeClr val="accent1"/>
+          </a:fillRef>
+          <a:effectRef idx="0">
+            <a:schemeClr val="accent1"/>
+          </a:effectRef>
+          <a:fontRef idx="minor">
+            <a:schemeClr val="lt1"/>
+          </a:fontRef>
+        </p:style>
+        <p:txBody>
+          <a:bodyPr rtlCol="0" anchor="ctr"/>
+          <a:lstStyle/>
+          <a:p>
+            <a:pPr algn="ctr"/>
+            <a:r>
+              <a:rPr lang="ru-RU" sz="1400" dirty="0" smtClean="0">
+                <a:solidFill>
+                  <a:schemeClr val="tx1"/>
+                </a:solidFill>
+              </a:rPr>
+              <a:t>Выход</a:t>
+            </a:r>
+            <a:endParaRPr lang="ru-RU" sz="1400" dirty="0">
+              <a:solidFill>
+                <a:schemeClr val="tx1"/>
+              </a:solidFill>
+            </a:endParaRPr>
+          </a:p>
+        </p:txBody>
+      </p:sp>
+      <p:cxnSp>
+        <p:nvCxnSpPr>
+          <p:cNvPr id="20" name="Прямая со стрелкой 19"/>
+          <p:cNvCxnSpPr>
+            <a:stCxn id="5" idx="2"/>
+            <a:endCxn id="7" idx="0"/>
+          </p:cNvCxnSpPr>
+          <p:nvPr/>
+        </p:nvCxnSpPr>
+        <p:spPr>
+          <a:xfrm flipH="1">
+            <a:off x="4497974" y="313508"/>
+            <a:ext cx="3" cy="170318"/>
+          </a:xfrm>
+          <a:prstGeom prst="straightConnector1">
+            <a:avLst/>
+          </a:prstGeom>
+          <a:ln>
+            <a:solidFill>
+              <a:srgbClr val="0070C0"/>
+            </a:solidFill>
+            <a:tailEnd type="triangle"/>
+          </a:ln>
+        </p:spPr>
+        <p:style>
+          <a:lnRef idx="1">
+            <a:schemeClr val="accent1"/>
+          </a:lnRef>
+          <a:fillRef idx="0">
+            <a:schemeClr val="accent1"/>
+          </a:fillRef>
+          <a:effectRef idx="0">
+            <a:schemeClr val="accent1"/>
+          </a:effectRef>
+          <a:fontRef idx="minor">
+            <a:schemeClr val="tx1"/>
+          </a:fontRef>
+        </p:style>
+      </p:cxnSp>
+      <p:cxnSp>
+        <p:nvCxnSpPr>
+          <p:cNvPr id="23" name="Прямая со стрелкой 22"/>
+          <p:cNvCxnSpPr/>
+          <p:nvPr/>
+        </p:nvCxnSpPr>
+        <p:spPr>
+          <a:xfrm flipH="1">
+            <a:off x="4497971" y="870966"/>
+            <a:ext cx="3" cy="170318"/>
+          </a:xfrm>
+          <a:prstGeom prst="straightConnector1">
+            <a:avLst/>
+          </a:prstGeom>
+          <a:ln>
+            <a:solidFill>
+              <a:srgbClr val="0070C0"/>
+            </a:solidFill>
+            <a:tailEnd type="triangle"/>
+          </a:ln>
+        </p:spPr>
+        <p:style>
+          <a:lnRef idx="1">
+            <a:schemeClr val="accent1"/>
+          </a:lnRef>
+          <a:fillRef idx="0">
+            <a:schemeClr val="accent1"/>
+          </a:fillRef>
+          <a:effectRef idx="0">
+            <a:schemeClr val="accent1"/>
+          </a:effectRef>
+          <a:fontRef idx="minor">
+            <a:schemeClr val="tx1"/>
+          </a:fontRef>
+        </p:style>
+      </p:cxnSp>
+      <p:cxnSp>
+        <p:nvCxnSpPr>
+          <p:cNvPr id="25" name="Прямая со стрелкой 24"/>
+          <p:cNvCxnSpPr>
+            <a:stCxn id="8" idx="2"/>
+            <a:endCxn id="9" idx="0"/>
+          </p:cNvCxnSpPr>
+          <p:nvPr/>
+        </p:nvCxnSpPr>
+        <p:spPr>
+          <a:xfrm>
+            <a:off x="4497971" y="1462366"/>
+            <a:ext cx="0" cy="232595"/>
+          </a:xfrm>
+          <a:prstGeom prst="straightConnector1">
+            <a:avLst/>
+          </a:prstGeom>
+          <a:ln>
+            <a:solidFill>
+              <a:srgbClr val="0070C0"/>
+            </a:solidFill>
+            <a:tailEnd type="triangle"/>
+          </a:ln>
+        </p:spPr>
+        <p:style>
+          <a:lnRef idx="1">
+            <a:schemeClr val="accent1"/>
+          </a:lnRef>
+          <a:fillRef idx="0">
+            <a:schemeClr val="accent1"/>
+          </a:fillRef>
+          <a:effectRef idx="0">
+            <a:schemeClr val="accent1"/>
+          </a:effectRef>
+          <a:fontRef idx="minor">
+            <a:schemeClr val="tx1"/>
+          </a:fontRef>
+        </p:style>
+      </p:cxnSp>
+      <p:cxnSp>
+        <p:nvCxnSpPr>
+          <p:cNvPr id="27" name="Прямая со стрелкой 26"/>
+          <p:cNvCxnSpPr>
+            <a:stCxn id="9" idx="2"/>
+            <a:endCxn id="10" idx="0"/>
+          </p:cNvCxnSpPr>
+          <p:nvPr/>
+        </p:nvCxnSpPr>
+        <p:spPr>
+          <a:xfrm>
+            <a:off x="4497971" y="2058434"/>
+            <a:ext cx="4" cy="310298"/>
+          </a:xfrm>
+          <a:prstGeom prst="straightConnector1">
+            <a:avLst/>
+          </a:prstGeom>
+          <a:ln>
+            <a:solidFill>
+              <a:srgbClr val="0070C0"/>
+            </a:solidFill>
+            <a:tailEnd type="triangle"/>
+          </a:ln>
+        </p:spPr>
+        <p:style>
+          <a:lnRef idx="1">
+            <a:schemeClr val="accent1"/>
+          </a:lnRef>
+          <a:fillRef idx="0">
+            <a:schemeClr val="accent1"/>
+          </a:fillRef>
+          <a:effectRef idx="0">
+            <a:schemeClr val="accent1"/>
+          </a:effectRef>
+          <a:fontRef idx="minor">
+            <a:schemeClr val="tx1"/>
+          </a:fontRef>
+        </p:style>
+      </p:cxnSp>
+      <p:cxnSp>
+        <p:nvCxnSpPr>
+          <p:cNvPr id="29" name="Прямая со стрелкой 28"/>
+          <p:cNvCxnSpPr>
+            <a:stCxn id="10" idx="2"/>
+            <a:endCxn id="11" idx="0"/>
+          </p:cNvCxnSpPr>
+          <p:nvPr/>
+        </p:nvCxnSpPr>
+        <p:spPr>
+          <a:xfrm flipH="1">
+            <a:off x="4497974" y="2926080"/>
+            <a:ext cx="1" cy="121920"/>
+          </a:xfrm>
+          <a:prstGeom prst="straightConnector1">
+            <a:avLst/>
+          </a:prstGeom>
+          <a:ln>
+            <a:solidFill>
+              <a:srgbClr val="0070C0"/>
+            </a:solidFill>
+            <a:tailEnd type="triangle"/>
+          </a:ln>
+        </p:spPr>
+        <p:style>
+          <a:lnRef idx="1">
+            <a:schemeClr val="accent1"/>
+          </a:lnRef>
+          <a:fillRef idx="0">
+            <a:schemeClr val="accent1"/>
+          </a:fillRef>
+          <a:effectRef idx="0">
+            <a:schemeClr val="accent1"/>
+          </a:effectRef>
+          <a:fontRef idx="minor">
+            <a:schemeClr val="tx1"/>
+          </a:fontRef>
+        </p:style>
+      </p:cxnSp>
+      <p:cxnSp>
+        <p:nvCxnSpPr>
+          <p:cNvPr id="33" name="Прямая со стрелкой 32"/>
+          <p:cNvCxnSpPr>
+            <a:stCxn id="11" idx="1"/>
+            <a:endCxn id="14" idx="3"/>
+          </p:cNvCxnSpPr>
+          <p:nvPr/>
+        </p:nvCxnSpPr>
+        <p:spPr>
+          <a:xfrm flipH="1" flipV="1">
+            <a:off x="1985541" y="3788227"/>
+            <a:ext cx="1505777" cy="2"/>
+          </a:xfrm>
+          <a:prstGeom prst="straightConnector1">
+            <a:avLst/>
+          </a:prstGeom>
+          <a:ln>
+            <a:solidFill>
+              <a:srgbClr val="FF0000"/>
+            </a:solidFill>
+            <a:tailEnd type="triangle"/>
+          </a:ln>
+        </p:spPr>
+        <p:style>
+          <a:lnRef idx="1">
+            <a:schemeClr val="accent1"/>
+          </a:lnRef>
+          <a:fillRef idx="0">
+            <a:schemeClr val="accent1"/>
+          </a:fillRef>
+          <a:effectRef idx="0">
+            <a:schemeClr val="accent1"/>
+          </a:effectRef>
+          <a:fontRef idx="minor">
+            <a:schemeClr val="tx1"/>
+          </a:fontRef>
+        </p:style>
+      </p:cxnSp>
+      <p:cxnSp>
+        <p:nvCxnSpPr>
+          <p:cNvPr id="36" name="Прямая со стрелкой 35"/>
+          <p:cNvCxnSpPr>
+            <a:stCxn id="11" idx="3"/>
+            <a:endCxn id="15" idx="1"/>
+          </p:cNvCxnSpPr>
+          <p:nvPr/>
+        </p:nvCxnSpPr>
+        <p:spPr>
+          <a:xfrm flipV="1">
+            <a:off x="5504630" y="3788228"/>
+            <a:ext cx="1645194" cy="1"/>
+          </a:xfrm>
+          <a:prstGeom prst="straightConnector1">
+            <a:avLst/>
+          </a:prstGeom>
+          <a:ln>
+            <a:solidFill>
+              <a:srgbClr val="0070C0"/>
+            </a:solidFill>
+            <a:tailEnd type="triangle"/>
+          </a:ln>
+        </p:spPr>
+        <p:style>
+          <a:lnRef idx="1">
+            <a:schemeClr val="accent1"/>
+          </a:lnRef>
+          <a:fillRef idx="0">
+            <a:schemeClr val="accent1"/>
+          </a:fillRef>
+          <a:effectRef idx="0">
+            <a:schemeClr val="accent1"/>
+          </a:effectRef>
+          <a:fontRef idx="minor">
+            <a:schemeClr val="tx1"/>
+          </a:fontRef>
+        </p:style>
+      </p:cxnSp>
+      <p:cxnSp>
+        <p:nvCxnSpPr>
+          <p:cNvPr id="38" name="Прямая со стрелкой 37"/>
+          <p:cNvCxnSpPr>
+            <a:stCxn id="14" idx="2"/>
+            <a:endCxn id="16" idx="0"/>
+          </p:cNvCxnSpPr>
+          <p:nvPr/>
+        </p:nvCxnSpPr>
+        <p:spPr>
+          <a:xfrm flipH="1">
+            <a:off x="1275792" y="4040775"/>
+            <a:ext cx="1" cy="301107"/>
+          </a:xfrm>
+          <a:prstGeom prst="straightConnector1">
+            <a:avLst/>
+          </a:prstGeom>
+          <a:ln>
+            <a:solidFill>
+              <a:srgbClr val="FF0000"/>
+            </a:solidFill>
+            <a:tailEnd type="triangle"/>
+          </a:ln>
+        </p:spPr>
+        <p:style>
+          <a:lnRef idx="1">
+            <a:schemeClr val="accent1"/>
+          </a:lnRef>
+          <a:fillRef idx="0">
+            <a:schemeClr val="accent1"/>
+          </a:fillRef>
+          <a:effectRef idx="0">
+            <a:schemeClr val="accent1"/>
+          </a:effectRef>
+          <a:fontRef idx="minor">
+            <a:schemeClr val="tx1"/>
+          </a:fontRef>
+        </p:style>
+      </p:cxnSp>
+      <p:cxnSp>
+        <p:nvCxnSpPr>
+          <p:cNvPr id="40" name="Прямая со стрелкой 39"/>
+          <p:cNvCxnSpPr>
+            <a:stCxn id="15" idx="2"/>
+            <a:endCxn id="17" idx="0"/>
+          </p:cNvCxnSpPr>
+          <p:nvPr/>
+        </p:nvCxnSpPr>
+        <p:spPr>
+          <a:xfrm flipH="1">
+            <a:off x="7859572" y="4040776"/>
+            <a:ext cx="1" cy="398418"/>
+          </a:xfrm>
+          <a:prstGeom prst="straightConnector1">
+            <a:avLst/>
+          </a:prstGeom>
+          <a:ln>
+            <a:solidFill>
+              <a:srgbClr val="0070C0"/>
+            </a:solidFill>
+            <a:tailEnd type="triangle"/>
+          </a:ln>
+        </p:spPr>
+        <p:style>
+          <a:lnRef idx="1">
+            <a:schemeClr val="accent1"/>
+          </a:lnRef>
+          <a:fillRef idx="0">
+            <a:schemeClr val="accent1"/>
+          </a:fillRef>
+          <a:effectRef idx="0">
+            <a:schemeClr val="accent1"/>
+          </a:effectRef>
+          <a:fontRef idx="minor">
+            <a:schemeClr val="tx1"/>
+          </a:fontRef>
+        </p:style>
+      </p:cxnSp>
+      <p:cxnSp>
+        <p:nvCxnSpPr>
+          <p:cNvPr id="46" name="Соединительная линия уступом 45"/>
+          <p:cNvCxnSpPr>
+            <a:stCxn id="16" idx="3"/>
+            <a:endCxn id="11" idx="2"/>
+          </p:cNvCxnSpPr>
+          <p:nvPr/>
+        </p:nvCxnSpPr>
+        <p:spPr>
+          <a:xfrm flipV="1">
+            <a:off x="2278887" y="4528458"/>
+            <a:ext cx="2219087" cy="157424"/>
+          </a:xfrm>
+          <a:prstGeom prst="bentConnector2">
+            <a:avLst/>
+          </a:prstGeom>
+          <a:ln>
+            <a:solidFill>
+              <a:srgbClr val="FF0000"/>
+            </a:solidFill>
+            <a:tailEnd type="triangle"/>
+          </a:ln>
+        </p:spPr>
+        <p:style>
+          <a:lnRef idx="1">
+            <a:schemeClr val="accent1"/>
+          </a:lnRef>
+          <a:fillRef idx="0">
+            <a:schemeClr val="accent1"/>
+          </a:fillRef>
+          <a:effectRef idx="0">
+            <a:schemeClr val="accent1"/>
+          </a:effectRef>
+          <a:fontRef idx="minor">
+            <a:schemeClr val="tx1"/>
+          </a:fontRef>
+        </p:style>
+      </p:cxnSp>
+      <p:cxnSp>
+        <p:nvCxnSpPr>
+          <p:cNvPr id="48" name="Соединительная линия уступом 47"/>
+          <p:cNvCxnSpPr>
+            <a:stCxn id="17" idx="2"/>
+            <a:endCxn id="18" idx="3"/>
+          </p:cNvCxnSpPr>
+          <p:nvPr/>
+        </p:nvCxnSpPr>
+        <p:spPr>
+          <a:xfrm rot="5400000">
+            <a:off x="5794857" y="4430094"/>
+            <a:ext cx="1550519" cy="2578912"/>
+          </a:xfrm>
+          <a:prstGeom prst="bentConnector2">
+            <a:avLst/>
+          </a:prstGeom>
+          <a:ln>
+            <a:solidFill>
+              <a:srgbClr val="0070C0"/>
+            </a:solidFill>
+            <a:tailEnd type="triangle"/>
+          </a:ln>
+        </p:spPr>
+        <p:style>
+          <a:lnRef idx="1">
+            <a:schemeClr val="accent1"/>
+          </a:lnRef>
+          <a:fillRef idx="0">
+            <a:schemeClr val="accent1"/>
+          </a:fillRef>
+          <a:effectRef idx="0">
+            <a:schemeClr val="accent1"/>
+          </a:effectRef>
+          <a:fontRef idx="minor">
+            <a:schemeClr val="tx1"/>
+          </a:fontRef>
+        </p:style>
+      </p:cxnSp>
+      <p:cxnSp>
+        <p:nvCxnSpPr>
+          <p:cNvPr id="50" name="Соединительная линия уступом 49"/>
+          <p:cNvCxnSpPr>
+            <a:stCxn id="16" idx="2"/>
+            <a:endCxn id="18" idx="1"/>
+          </p:cNvCxnSpPr>
+          <p:nvPr/>
+        </p:nvCxnSpPr>
+        <p:spPr>
+          <a:xfrm rot="16200000" flipH="1">
+            <a:off x="1836013" y="4469659"/>
+            <a:ext cx="1464929" cy="2585371"/>
+          </a:xfrm>
+          <a:prstGeom prst="bentConnector2">
+            <a:avLst/>
+          </a:prstGeom>
+          <a:ln>
+            <a:solidFill>
+              <a:srgbClr val="FF0000"/>
+            </a:solidFill>
+            <a:tailEnd type="triangle"/>
+          </a:ln>
+        </p:spPr>
+        <p:style>
+          <a:lnRef idx="1">
+            <a:schemeClr val="accent1"/>
+          </a:lnRef>
+          <a:fillRef idx="0">
+            <a:schemeClr val="accent1"/>
+          </a:fillRef>
+          <a:effectRef idx="0">
+            <a:schemeClr val="accent1"/>
+          </a:effectRef>
+          <a:fontRef idx="minor">
+            <a:schemeClr val="tx1"/>
+          </a:fontRef>
+        </p:style>
+      </p:cxnSp>
+      <p:sp>
+        <p:nvSpPr>
+          <p:cNvPr id="58" name="TextBox 57"/>
+          <p:cNvSpPr txBox="1"/>
+          <p:nvPr/>
+        </p:nvSpPr>
+        <p:spPr>
+          <a:xfrm>
+            <a:off x="2779131" y="4763257"/>
+            <a:ext cx="843501" cy="261610"/>
+          </a:xfrm>
+          <a:prstGeom prst="rect">
+            <a:avLst/>
+          </a:prstGeom>
+          <a:noFill/>
+        </p:spPr>
+        <p:txBody>
+          <a:bodyPr wrap="none" rtlCol="0">
+            <a:spAutoFit/>
+          </a:bodyPr>
+          <a:lstStyle/>
+          <a:p>
+            <a:r>
+              <a:rPr lang="ru-RU" sz="1100" dirty="0" smtClean="0"/>
+              <a:t>Апелляция</a:t>
+            </a:r>
+            <a:endParaRPr lang="ru-RU" dirty="0"/>
+          </a:p>
+        </p:txBody>
+      </p:sp>
+      <p:sp>
+        <p:nvSpPr>
+          <p:cNvPr id="59" name="TextBox 58"/>
+          <p:cNvSpPr txBox="1"/>
+          <p:nvPr/>
+        </p:nvSpPr>
+        <p:spPr>
+          <a:xfrm>
+            <a:off x="2193680" y="3562125"/>
+            <a:ext cx="1136850" cy="261610"/>
           </a:xfrm>
           <a:prstGeom prst="rect">
             <a:avLst/>
@@ -3527,47 +4232,68 @@
           <a:ln>
             <a:noFill/>
           </a:ln>
-          <a:effectLst/>
-          <a:extLst>
-            <a:ext uri="{909E8E84-426E-40DD-AFC4-6F175D3DCCD1}">
-              <a14:hiddenFill xmlns:a14="http://schemas.microsoft.com/office/drawing/2010/main">
-                <a:solidFill>
-                  <a:schemeClr val="accent1"/>
-                </a:solidFill>
-              </a14:hiddenFill>
-            </a:ext>
-            <a:ext uri="{91240B29-F687-4F45-9708-019B960494DF}">
-              <a14:hiddenLine xmlns:a14="http://schemas.microsoft.com/office/drawing/2010/main" w="9525">
-                <a:solidFill>
-                  <a:schemeClr val="tx1"/>
-                </a:solidFill>
-                <a:miter lim="800000"/>
-                <a:headEnd/>
-                <a:tailEnd/>
-              </a14:hiddenLine>
-            </a:ext>
-            <a:ext uri="{AF507438-7753-43E0-B8FC-AC1667EBCBE1}">
-              <a14:hiddenEffects xmlns:a14="http://schemas.microsoft.com/office/drawing/2010/main">
-                <a:effectLst>
-                  <a:outerShdw dist="35921" dir="2700000" algn="ctr" rotWithShape="0">
-                    <a:schemeClr val="bg2"/>
-                  </a:outerShdw>
-                </a:effectLst>
-              </a14:hiddenEffects>
-            </a:ext>
-          </a:extLst>
-        </p:spPr>
-      </p:pic>
+        </p:spPr>
+        <p:txBody>
+          <a:bodyPr wrap="none" rtlCol="0">
+            <a:spAutoFit/>
+          </a:bodyPr>
+          <a:lstStyle/>
+          <a:p>
+            <a:r>
+              <a:rPr lang="ru-RU" sz="1100" dirty="0" smtClean="0"/>
+              <a:t>Отрицательный</a:t>
+            </a:r>
+            <a:endParaRPr lang="ru-RU" dirty="0"/>
+          </a:p>
+        </p:txBody>
+      </p:sp>
+      <p:sp>
+        <p:nvSpPr>
+          <p:cNvPr id="60" name="TextBox 59"/>
+          <p:cNvSpPr txBox="1"/>
+          <p:nvPr/>
+        </p:nvSpPr>
+        <p:spPr>
+          <a:xfrm>
+            <a:off x="5651323" y="3526620"/>
+            <a:ext cx="1176925" cy="261610"/>
+          </a:xfrm>
+          <a:prstGeom prst="rect">
+            <a:avLst/>
+          </a:prstGeom>
+          <a:noFill/>
+        </p:spPr>
+        <p:txBody>
+          <a:bodyPr wrap="none" rtlCol="0">
+            <a:spAutoFit/>
+          </a:bodyPr>
+          <a:lstStyle/>
+          <a:p>
+            <a:r>
+              <a:rPr lang="ru-RU" sz="1100" dirty="0" smtClean="0"/>
+              <a:t>Положительный</a:t>
+            </a:r>
+            <a:endParaRPr lang="ru-RU" dirty="0"/>
+          </a:p>
+        </p:txBody>
+      </p:sp>
     </p:spTree>
     <p:extLst>
       <p:ext uri="{BB962C8B-B14F-4D97-AF65-F5344CB8AC3E}">
-        <p14:creationId xmlns:p14="http://schemas.microsoft.com/office/powerpoint/2010/main" val="1523905142"/>
+        <p14:creationId xmlns:p14="http://schemas.microsoft.com/office/powerpoint/2010/main" val="3101762978"/>
       </p:ext>
     </p:extLst>
   </p:cSld>
   <p:clrMapOvr>
     <a:masterClrMapping/>
   </p:clrMapOvr>
+  <p:timing>
+    <p:tnLst>
+      <p:par>
+        <p:cTn id="1" dur="indefinite" restart="never" nodeType="tmRoot"/>
+      </p:par>
+    </p:tnLst>
+  </p:timing>
 </p:sld>
 </file>
 
@@ -3582,39 +4308,39 @@
         <a:sysClr val="window" lastClr="FFFFFF"/>
       </a:lt1>
       <a:dk2>
-        <a:srgbClr val="1F497D"/>
+        <a:srgbClr val="44546A"/>
       </a:dk2>
       <a:lt2>
-        <a:srgbClr val="EEECE1"/>
+        <a:srgbClr val="E7E6E6"/>
       </a:lt2>
       <a:accent1>
-        <a:srgbClr val="4F81BD"/>
+        <a:srgbClr val="5B9BD5"/>
       </a:accent1>
       <a:accent2>
-        <a:srgbClr val="C0504D"/>
+        <a:srgbClr val="ED7D31"/>
       </a:accent2>
       <a:accent3>
-        <a:srgbClr val="9BBB59"/>
+        <a:srgbClr val="A5A5A5"/>
       </a:accent3>
       <a:accent4>
-        <a:srgbClr val="8064A2"/>
+        <a:srgbClr val="FFC000"/>
       </a:accent4>
       <a:accent5>
-        <a:srgbClr val="4BACC6"/>
+        <a:srgbClr val="4472C4"/>
       </a:accent5>
       <a:accent6>
-        <a:srgbClr val="F79646"/>
+        <a:srgbClr val="70AD47"/>
       </a:accent6>
       <a:hlink>
-        <a:srgbClr val="0000FF"/>
+        <a:srgbClr val="0563C1"/>
       </a:hlink>
       <a:folHlink>
-        <a:srgbClr val="800080"/>
+        <a:srgbClr val="954F72"/>
       </a:folHlink>
     </a:clrScheme>
     <a:fontScheme name="Стандартная">
       <a:majorFont>
-        <a:latin typeface="Calibri"/>
+        <a:latin typeface="Calibri Light" panose="020F0302020204030204"/>
         <a:ea typeface=""/>
         <a:cs typeface=""/>
         <a:font script="Jpan" typeface="ＭＳ Ｐゴシック"/>
@@ -3649,7 +4375,7 @@
         <a:font script="Geor" typeface="Sylfaen"/>
       </a:majorFont>
       <a:minorFont>
-        <a:latin typeface="Calibri"/>
+        <a:latin typeface="Calibri" panose="020F0502020204030204"/>
         <a:ea typeface=""/>
         <a:cs typeface=""/>
         <a:font script="Jpan" typeface="ＭＳ Ｐゴシック"/>
@@ -3693,165 +4419,141 @@
           <a:gsLst>
             <a:gs pos="0">
               <a:schemeClr val="phClr">
-                <a:tint val="50000"/>
-                <a:satMod val="300000"/>
+                <a:lumMod val="110000"/>
+                <a:satMod val="105000"/>
+                <a:tint val="67000"/>
               </a:schemeClr>
             </a:gs>
-            <a:gs pos="35000">
+            <a:gs pos="50000">
               <a:schemeClr val="phClr">
-                <a:tint val="37000"/>
-                <a:satMod val="300000"/>
+                <a:lumMod val="105000"/>
+                <a:satMod val="103000"/>
+                <a:tint val="73000"/>
               </a:schemeClr>
             </a:gs>
             <a:gs pos="100000">
               <a:schemeClr val="phClr">
-                <a:tint val="15000"/>
-                <a:satMod val="350000"/>
+                <a:lumMod val="105000"/>
+                <a:satMod val="109000"/>
+                <a:tint val="81000"/>
               </a:schemeClr>
             </a:gs>
           </a:gsLst>
-          <a:lin ang="16200000" scaled="1"/>
+          <a:lin ang="5400000" scaled="0"/>
         </a:gradFill>
         <a:gradFill rotWithShape="1">
           <a:gsLst>
             <a:gs pos="0">
               <a:schemeClr val="phClr">
-                <a:shade val="51000"/>
-                <a:satMod val="130000"/>
+                <a:satMod val="103000"/>
+                <a:lumMod val="102000"/>
+                <a:tint val="94000"/>
               </a:schemeClr>
             </a:gs>
-            <a:gs pos="80000">
+            <a:gs pos="50000">
               <a:schemeClr val="phClr">
-                <a:shade val="93000"/>
-                <a:satMod val="130000"/>
+                <a:satMod val="110000"/>
+                <a:lumMod val="100000"/>
+                <a:shade val="100000"/>
               </a:schemeClr>
             </a:gs>
             <a:gs pos="100000">
               <a:schemeClr val="phClr">
-                <a:shade val="94000"/>
-                <a:satMod val="135000"/>
+                <a:lumMod val="99000"/>
+                <a:satMod val="120000"/>
+                <a:shade val="78000"/>
               </a:schemeClr>
             </a:gs>
           </a:gsLst>
-          <a:lin ang="16200000" scaled="0"/>
+          <a:lin ang="5400000" scaled="0"/>
         </a:gradFill>
       </a:fillStyleLst>
       <a:lnStyleLst>
-        <a:ln w="9525" cap="flat" cmpd="sng" algn="ctr">
-          <a:solidFill>
-            <a:schemeClr val="phClr">
-              <a:shade val="95000"/>
-              <a:satMod val="105000"/>
-            </a:schemeClr>
-          </a:solidFill>
-          <a:prstDash val="solid"/>
-        </a:ln>
-        <a:ln w="25400" cap="flat" cmpd="sng" algn="ctr">
+        <a:ln w="6350" cap="flat" cmpd="sng" algn="ctr">
           <a:solidFill>
             <a:schemeClr val="phClr"/>
           </a:solidFill>
           <a:prstDash val="solid"/>
+          <a:miter lim="800000"/>
         </a:ln>
-        <a:ln w="38100" cap="flat" cmpd="sng" algn="ctr">
+        <a:ln w="12700" cap="flat" cmpd="sng" algn="ctr">
           <a:solidFill>
             <a:schemeClr val="phClr"/>
           </a:solidFill>
           <a:prstDash val="solid"/>
+          <a:miter lim="800000"/>
+        </a:ln>
+        <a:ln w="19050" cap="flat" cmpd="sng" algn="ctr">
+          <a:solidFill>
+            <a:schemeClr val="phClr"/>
+          </a:solidFill>
+          <a:prstDash val="solid"/>
+          <a:miter lim="800000"/>
         </a:ln>
       </a:lnStyleLst>
       <a:effectStyleLst>
         <a:effectStyle>
+          <a:effectLst/>
+        </a:effectStyle>
+        <a:effectStyle>
+          <a:effectLst/>
+        </a:effectStyle>
+        <a:effectStyle>
           <a:effectLst>
-            <a:outerShdw blurRad="40000" dist="20000" dir="5400000" rotWithShape="0">
+            <a:outerShdw blurRad="57150" dist="19050" dir="5400000" algn="ctr" rotWithShape="0">
               <a:srgbClr val="000000">
-                <a:alpha val="38000"/>
+                <a:alpha val="63000"/>
               </a:srgbClr>
             </a:outerShdw>
           </a:effectLst>
-        </a:effectStyle>
-        <a:effectStyle>
-          <a:effectLst>
-            <a:outerShdw blurRad="40000" dist="23000" dir="5400000" rotWithShape="0">
-              <a:srgbClr val="000000">
-                <a:alpha val="35000"/>
-              </a:srgbClr>
-            </a:outerShdw>
-          </a:effectLst>
-        </a:effectStyle>
-        <a:effectStyle>
-          <a:effectLst>
-            <a:outerShdw blurRad="40000" dist="23000" dir="5400000" rotWithShape="0">
-              <a:srgbClr val="000000">
-                <a:alpha val="35000"/>
-              </a:srgbClr>
-            </a:outerShdw>
-          </a:effectLst>
-          <a:scene3d>
-            <a:camera prst="orthographicFront">
-              <a:rot lat="0" lon="0" rev="0"/>
-            </a:camera>
-            <a:lightRig rig="threePt" dir="t">
-              <a:rot lat="0" lon="0" rev="1200000"/>
-            </a:lightRig>
-          </a:scene3d>
-          <a:sp3d>
-            <a:bevelT w="63500" h="25400"/>
-          </a:sp3d>
         </a:effectStyle>
       </a:effectStyleLst>
       <a:bgFillStyleLst>
         <a:solidFill>
           <a:schemeClr val="phClr"/>
         </a:solidFill>
+        <a:solidFill>
+          <a:schemeClr val="phClr">
+            <a:tint val="95000"/>
+            <a:satMod val="170000"/>
+          </a:schemeClr>
+        </a:solidFill>
         <a:gradFill rotWithShape="1">
           <a:gsLst>
             <a:gs pos="0">
               <a:schemeClr val="phClr">
-                <a:tint val="40000"/>
-                <a:satMod val="350000"/>
+                <a:tint val="93000"/>
+                <a:satMod val="150000"/>
+                <a:shade val="98000"/>
+                <a:lumMod val="102000"/>
               </a:schemeClr>
             </a:gs>
-            <a:gs pos="40000">
+            <a:gs pos="50000">
               <a:schemeClr val="phClr">
-                <a:tint val="45000"/>
-                <a:shade val="99000"/>
-                <a:satMod val="350000"/>
+                <a:tint val="98000"/>
+                <a:satMod val="130000"/>
+                <a:shade val="90000"/>
+                <a:lumMod val="103000"/>
               </a:schemeClr>
             </a:gs>
             <a:gs pos="100000">
               <a:schemeClr val="phClr">
-                <a:shade val="20000"/>
-                <a:satMod val="255000"/>
+                <a:shade val="63000"/>
+                <a:satMod val="120000"/>
               </a:schemeClr>
             </a:gs>
           </a:gsLst>
-          <a:path path="circle">
-            <a:fillToRect l="50000" t="-80000" r="50000" b="180000"/>
-          </a:path>
-        </a:gradFill>
-        <a:gradFill rotWithShape="1">
-          <a:gsLst>
-            <a:gs pos="0">
-              <a:schemeClr val="phClr">
-                <a:tint val="80000"/>
-                <a:satMod val="300000"/>
-              </a:schemeClr>
-            </a:gs>
-            <a:gs pos="100000">
-              <a:schemeClr val="phClr">
-                <a:shade val="30000"/>
-                <a:satMod val="200000"/>
-              </a:schemeClr>
-            </a:gs>
-          </a:gsLst>
-          <a:path path="circle">
-            <a:fillToRect l="50000" t="50000" r="50000" b="50000"/>
-          </a:path>
+          <a:lin ang="5400000" scaled="0"/>
         </a:gradFill>
       </a:bgFillStyleLst>
     </a:fmtScheme>
   </a:themeElements>
   <a:objectDefaults/>
   <a:extraClrSchemeLst/>
+  <a:extLst>
+    <a:ext uri="{05A4C25C-085E-4340-85A3-A5531E510DB2}">
+      <thm15:themeFamily xmlns:thm15="http://schemas.microsoft.com/office/thememl/2012/main" name="Office Theme" id="{62F939B6-93AF-4DB8-9C6B-D6C7DFDC589F}" vid="{4A3C46E8-61CC-4603-A589-7422A47A8E4A}"/>
+    </a:ext>
+  </a:extLst>
 </a:theme>
 </file>
</xml_diff>